<commit_message>
last versin of the assignment part 1 of ppt is finished
</commit_message>
<xml_diff>
--- a/开题报告.pptx
+++ b/开题报告.pptx
@@ -4,9 +4,17 @@
   <p:sldMasterIdLst>
     <p:sldMasterId id="2147483648" r:id="rId1"/>
   </p:sldMasterIdLst>
+  <p:notesMasterIdLst>
+    <p:notesMasterId r:id="rId9"/>
+  </p:notesMasterIdLst>
   <p:sldIdLst>
-    <p:sldId id="256" r:id="rId2"/>
-    <p:sldId id="257" r:id="rId3"/>
+    <p:sldId id="257" r:id="rId2"/>
+    <p:sldId id="258" r:id="rId3"/>
+    <p:sldId id="259" r:id="rId4"/>
+    <p:sldId id="260" r:id="rId5"/>
+    <p:sldId id="263" r:id="rId6"/>
+    <p:sldId id="261" r:id="rId7"/>
+    <p:sldId id="262" r:id="rId8"/>
   </p:sldIdLst>
   <p:sldSz cx="12192000" cy="6858000"/>
   <p:notesSz cx="6858000" cy="9144000"/>
@@ -105,7 +113,472 @@
       </a:defRPr>
     </a:lvl9pPr>
   </p:defaultTextStyle>
+  <p:extLst>
+    <p:ext uri="{EFAFB233-063F-42B5-8137-9DF3F51BA10A}">
+      <p15:sldGuideLst xmlns:p15="http://schemas.microsoft.com/office/powerpoint/2012/main"/>
+    </p:ext>
+  </p:extLst>
 </p:presentation>
+</file>
+
+<file path=ppt/notesMasters/notesMaster1.xml><?xml version="1.0" encoding="utf-8"?>
+<p:notesMaster xmlns:a="http://schemas.openxmlformats.org/drawingml/2006/main" xmlns:r="http://schemas.openxmlformats.org/officeDocument/2006/relationships" xmlns:p="http://schemas.openxmlformats.org/presentationml/2006/main">
+  <p:cSld>
+    <p:bg>
+      <p:bgRef idx="1001">
+        <a:schemeClr val="bg1"/>
+      </p:bgRef>
+    </p:bg>
+    <p:spTree>
+      <p:nvGrpSpPr>
+        <p:cNvPr id="1" name=""/>
+        <p:cNvGrpSpPr/>
+        <p:nvPr/>
+      </p:nvGrpSpPr>
+      <p:grpSpPr>
+        <a:xfrm>
+          <a:off x="0" y="0"/>
+          <a:ext cx="0" cy="0"/>
+          <a:chOff x="0" y="0"/>
+          <a:chExt cx="0" cy="0"/>
+        </a:xfrm>
+      </p:grpSpPr>
+      <p:sp>
+        <p:nvSpPr>
+          <p:cNvPr id="2" name="页眉占位符 1"/>
+          <p:cNvSpPr>
+            <a:spLocks noGrp="1"/>
+          </p:cNvSpPr>
+          <p:nvPr>
+            <p:ph type="hdr" sz="quarter"/>
+          </p:nvPr>
+        </p:nvSpPr>
+        <p:spPr>
+          <a:xfrm>
+            <a:off x="0" y="0"/>
+            <a:ext cx="2971800" cy="458788"/>
+          </a:xfrm>
+          <a:prstGeom prst="rect">
+            <a:avLst/>
+          </a:prstGeom>
+        </p:spPr>
+        <p:txBody>
+          <a:bodyPr vert="horz" lIns="91440" tIns="45720" rIns="91440" bIns="45720" rtlCol="0"/>
+          <a:lstStyle>
+            <a:lvl1pPr algn="l">
+              <a:defRPr sz="1200"/>
+            </a:lvl1pPr>
+          </a:lstStyle>
+          <a:p>
+            <a:endParaRPr lang="zh-CN" altLang="en-US"/>
+          </a:p>
+        </p:txBody>
+      </p:sp>
+      <p:sp>
+        <p:nvSpPr>
+          <p:cNvPr id="3" name="日期占位符 2"/>
+          <p:cNvSpPr>
+            <a:spLocks noGrp="1"/>
+          </p:cNvSpPr>
+          <p:nvPr>
+            <p:ph type="dt" idx="1"/>
+          </p:nvPr>
+        </p:nvSpPr>
+        <p:spPr>
+          <a:xfrm>
+            <a:off x="3884613" y="0"/>
+            <a:ext cx="2971800" cy="458788"/>
+          </a:xfrm>
+          <a:prstGeom prst="rect">
+            <a:avLst/>
+          </a:prstGeom>
+        </p:spPr>
+        <p:txBody>
+          <a:bodyPr vert="horz" lIns="91440" tIns="45720" rIns="91440" bIns="45720" rtlCol="0"/>
+          <a:lstStyle>
+            <a:lvl1pPr algn="r">
+              <a:defRPr sz="1200"/>
+            </a:lvl1pPr>
+          </a:lstStyle>
+          <a:p>
+            <a:fld id="{87DFD76C-87E3-4C37-B3E0-2C78E09FEF2C}" type="datetimeFigureOut">
+              <a:rPr lang="zh-CN" altLang="en-US" smtClean="0"/>
+              <a:t>2024/10/27</a:t>
+            </a:fld>
+            <a:endParaRPr lang="zh-CN" altLang="en-US"/>
+          </a:p>
+        </p:txBody>
+      </p:sp>
+      <p:sp>
+        <p:nvSpPr>
+          <p:cNvPr id="4" name="幻灯片图像占位符 3"/>
+          <p:cNvSpPr>
+            <a:spLocks noGrp="1" noRot="1" noChangeAspect="1"/>
+          </p:cNvSpPr>
+          <p:nvPr>
+            <p:ph type="sldImg" idx="2"/>
+          </p:nvPr>
+        </p:nvSpPr>
+        <p:spPr>
+          <a:xfrm>
+            <a:off x="685800" y="1143000"/>
+            <a:ext cx="5486400" cy="3086100"/>
+          </a:xfrm>
+          <a:prstGeom prst="rect">
+            <a:avLst/>
+          </a:prstGeom>
+          <a:noFill/>
+          <a:ln w="12700">
+            <a:solidFill>
+              <a:prstClr val="black"/>
+            </a:solidFill>
+          </a:ln>
+        </p:spPr>
+        <p:txBody>
+          <a:bodyPr vert="horz" lIns="91440" tIns="45720" rIns="91440" bIns="45720" rtlCol="0" anchor="ctr"/>
+          <a:lstStyle/>
+          <a:p>
+            <a:endParaRPr lang="zh-CN" altLang="en-US"/>
+          </a:p>
+        </p:txBody>
+      </p:sp>
+      <p:sp>
+        <p:nvSpPr>
+          <p:cNvPr id="5" name="备注占位符 4"/>
+          <p:cNvSpPr>
+            <a:spLocks noGrp="1"/>
+          </p:cNvSpPr>
+          <p:nvPr>
+            <p:ph type="body" sz="quarter" idx="3"/>
+          </p:nvPr>
+        </p:nvSpPr>
+        <p:spPr>
+          <a:xfrm>
+            <a:off x="685800" y="4400550"/>
+            <a:ext cx="5486400" cy="3600450"/>
+          </a:xfrm>
+          <a:prstGeom prst="rect">
+            <a:avLst/>
+          </a:prstGeom>
+        </p:spPr>
+        <p:txBody>
+          <a:bodyPr vert="horz" lIns="91440" tIns="45720" rIns="91440" bIns="45720" rtlCol="0"/>
+          <a:lstStyle/>
+          <a:p>
+            <a:pPr lvl="0"/>
+            <a:r>
+              <a:rPr lang="zh-CN" altLang="en-US"/>
+              <a:t>单击此处编辑母版文本样式</a:t>
+            </a:r>
+          </a:p>
+          <a:p>
+            <a:pPr lvl="1"/>
+            <a:r>
+              <a:rPr lang="zh-CN" altLang="en-US"/>
+              <a:t>二级</a:t>
+            </a:r>
+          </a:p>
+          <a:p>
+            <a:pPr lvl="2"/>
+            <a:r>
+              <a:rPr lang="zh-CN" altLang="en-US"/>
+              <a:t>三级</a:t>
+            </a:r>
+          </a:p>
+          <a:p>
+            <a:pPr lvl="3"/>
+            <a:r>
+              <a:rPr lang="zh-CN" altLang="en-US"/>
+              <a:t>四级</a:t>
+            </a:r>
+          </a:p>
+          <a:p>
+            <a:pPr lvl="4"/>
+            <a:r>
+              <a:rPr lang="zh-CN" altLang="en-US"/>
+              <a:t>五级</a:t>
+            </a:r>
+          </a:p>
+        </p:txBody>
+      </p:sp>
+      <p:sp>
+        <p:nvSpPr>
+          <p:cNvPr id="6" name="页脚占位符 5"/>
+          <p:cNvSpPr>
+            <a:spLocks noGrp="1"/>
+          </p:cNvSpPr>
+          <p:nvPr>
+            <p:ph type="ftr" sz="quarter" idx="4"/>
+          </p:nvPr>
+        </p:nvSpPr>
+        <p:spPr>
+          <a:xfrm>
+            <a:off x="0" y="8685213"/>
+            <a:ext cx="2971800" cy="458787"/>
+          </a:xfrm>
+          <a:prstGeom prst="rect">
+            <a:avLst/>
+          </a:prstGeom>
+        </p:spPr>
+        <p:txBody>
+          <a:bodyPr vert="horz" lIns="91440" tIns="45720" rIns="91440" bIns="45720" rtlCol="0" anchor="b"/>
+          <a:lstStyle>
+            <a:lvl1pPr algn="l">
+              <a:defRPr sz="1200"/>
+            </a:lvl1pPr>
+          </a:lstStyle>
+          <a:p>
+            <a:endParaRPr lang="zh-CN" altLang="en-US"/>
+          </a:p>
+        </p:txBody>
+      </p:sp>
+      <p:sp>
+        <p:nvSpPr>
+          <p:cNvPr id="7" name="灯片编号占位符 6"/>
+          <p:cNvSpPr>
+            <a:spLocks noGrp="1"/>
+          </p:cNvSpPr>
+          <p:nvPr>
+            <p:ph type="sldNum" sz="quarter" idx="5"/>
+          </p:nvPr>
+        </p:nvSpPr>
+        <p:spPr>
+          <a:xfrm>
+            <a:off x="3884613" y="8685213"/>
+            <a:ext cx="2971800" cy="458787"/>
+          </a:xfrm>
+          <a:prstGeom prst="rect">
+            <a:avLst/>
+          </a:prstGeom>
+        </p:spPr>
+        <p:txBody>
+          <a:bodyPr vert="horz" lIns="91440" tIns="45720" rIns="91440" bIns="45720" rtlCol="0" anchor="b"/>
+          <a:lstStyle>
+            <a:lvl1pPr algn="r">
+              <a:defRPr sz="1200"/>
+            </a:lvl1pPr>
+          </a:lstStyle>
+          <a:p>
+            <a:fld id="{2B8B2B85-DA0C-41B9-8C2D-3F95A2CB3C8E}" type="slidenum">
+              <a:rPr lang="zh-CN" altLang="en-US" smtClean="0"/>
+              <a:t>‹#›</a:t>
+            </a:fld>
+            <a:endParaRPr lang="zh-CN" altLang="en-US"/>
+          </a:p>
+        </p:txBody>
+      </p:sp>
+    </p:spTree>
+    <p:extLst>
+      <p:ext uri="{BB962C8B-B14F-4D97-AF65-F5344CB8AC3E}">
+        <p14:creationId xmlns:p14="http://schemas.microsoft.com/office/powerpoint/2010/main" val="1461631829"/>
+      </p:ext>
+    </p:extLst>
+  </p:cSld>
+  <p:clrMap bg1="lt1" tx1="dk1" bg2="lt2" tx2="dk2" accent1="accent1" accent2="accent2" accent3="accent3" accent4="accent4" accent5="accent5" accent6="accent6" hlink="hlink" folHlink="folHlink"/>
+  <p:notesStyle>
+    <a:lvl1pPr marL="0" algn="l" defTabSz="914400" rtl="0" eaLnBrk="1" latinLnBrk="0" hangingPunct="1">
+      <a:defRPr sz="1200" kern="1200">
+        <a:solidFill>
+          <a:schemeClr val="tx1"/>
+        </a:solidFill>
+        <a:latin typeface="+mn-lt"/>
+        <a:ea typeface="+mn-ea"/>
+        <a:cs typeface="+mn-cs"/>
+      </a:defRPr>
+    </a:lvl1pPr>
+    <a:lvl2pPr marL="457200" algn="l" defTabSz="914400" rtl="0" eaLnBrk="1" latinLnBrk="0" hangingPunct="1">
+      <a:defRPr sz="1200" kern="1200">
+        <a:solidFill>
+          <a:schemeClr val="tx1"/>
+        </a:solidFill>
+        <a:latin typeface="+mn-lt"/>
+        <a:ea typeface="+mn-ea"/>
+        <a:cs typeface="+mn-cs"/>
+      </a:defRPr>
+    </a:lvl2pPr>
+    <a:lvl3pPr marL="914400" algn="l" defTabSz="914400" rtl="0" eaLnBrk="1" latinLnBrk="0" hangingPunct="1">
+      <a:defRPr sz="1200" kern="1200">
+        <a:solidFill>
+          <a:schemeClr val="tx1"/>
+        </a:solidFill>
+        <a:latin typeface="+mn-lt"/>
+        <a:ea typeface="+mn-ea"/>
+        <a:cs typeface="+mn-cs"/>
+      </a:defRPr>
+    </a:lvl3pPr>
+    <a:lvl4pPr marL="1371600" algn="l" defTabSz="914400" rtl="0" eaLnBrk="1" latinLnBrk="0" hangingPunct="1">
+      <a:defRPr sz="1200" kern="1200">
+        <a:solidFill>
+          <a:schemeClr val="tx1"/>
+        </a:solidFill>
+        <a:latin typeface="+mn-lt"/>
+        <a:ea typeface="+mn-ea"/>
+        <a:cs typeface="+mn-cs"/>
+      </a:defRPr>
+    </a:lvl4pPr>
+    <a:lvl5pPr marL="1828800" algn="l" defTabSz="914400" rtl="0" eaLnBrk="1" latinLnBrk="0" hangingPunct="1">
+      <a:defRPr sz="1200" kern="1200">
+        <a:solidFill>
+          <a:schemeClr val="tx1"/>
+        </a:solidFill>
+        <a:latin typeface="+mn-lt"/>
+        <a:ea typeface="+mn-ea"/>
+        <a:cs typeface="+mn-cs"/>
+      </a:defRPr>
+    </a:lvl5pPr>
+    <a:lvl6pPr marL="2286000" algn="l" defTabSz="914400" rtl="0" eaLnBrk="1" latinLnBrk="0" hangingPunct="1">
+      <a:defRPr sz="1200" kern="1200">
+        <a:solidFill>
+          <a:schemeClr val="tx1"/>
+        </a:solidFill>
+        <a:latin typeface="+mn-lt"/>
+        <a:ea typeface="+mn-ea"/>
+        <a:cs typeface="+mn-cs"/>
+      </a:defRPr>
+    </a:lvl6pPr>
+    <a:lvl7pPr marL="2743200" algn="l" defTabSz="914400" rtl="0" eaLnBrk="1" latinLnBrk="0" hangingPunct="1">
+      <a:defRPr sz="1200" kern="1200">
+        <a:solidFill>
+          <a:schemeClr val="tx1"/>
+        </a:solidFill>
+        <a:latin typeface="+mn-lt"/>
+        <a:ea typeface="+mn-ea"/>
+        <a:cs typeface="+mn-cs"/>
+      </a:defRPr>
+    </a:lvl7pPr>
+    <a:lvl8pPr marL="3200400" algn="l" defTabSz="914400" rtl="0" eaLnBrk="1" latinLnBrk="0" hangingPunct="1">
+      <a:defRPr sz="1200" kern="1200">
+        <a:solidFill>
+          <a:schemeClr val="tx1"/>
+        </a:solidFill>
+        <a:latin typeface="+mn-lt"/>
+        <a:ea typeface="+mn-ea"/>
+        <a:cs typeface="+mn-cs"/>
+      </a:defRPr>
+    </a:lvl8pPr>
+    <a:lvl9pPr marL="3657600" algn="l" defTabSz="914400" rtl="0" eaLnBrk="1" latinLnBrk="0" hangingPunct="1">
+      <a:defRPr sz="1200" kern="1200">
+        <a:solidFill>
+          <a:schemeClr val="tx1"/>
+        </a:solidFill>
+        <a:latin typeface="+mn-lt"/>
+        <a:ea typeface="+mn-ea"/>
+        <a:cs typeface="+mn-cs"/>
+      </a:defRPr>
+    </a:lvl9pPr>
+  </p:notesStyle>
+</p:notesMaster>
+</file>
+
+<file path=ppt/notesSlides/notesSlide1.xml><?xml version="1.0" encoding="utf-8"?>
+<p:notes xmlns:a="http://schemas.openxmlformats.org/drawingml/2006/main" xmlns:r="http://schemas.openxmlformats.org/officeDocument/2006/relationships" xmlns:p="http://schemas.openxmlformats.org/presentationml/2006/main">
+  <p:cSld>
+    <p:spTree>
+      <p:nvGrpSpPr>
+        <p:cNvPr id="1" name=""/>
+        <p:cNvGrpSpPr/>
+        <p:nvPr/>
+      </p:nvGrpSpPr>
+      <p:grpSpPr>
+        <a:xfrm>
+          <a:off x="0" y="0"/>
+          <a:ext cx="0" cy="0"/>
+          <a:chOff x="0" y="0"/>
+          <a:chExt cx="0" cy="0"/>
+        </a:xfrm>
+      </p:grpSpPr>
+      <p:sp>
+        <p:nvSpPr>
+          <p:cNvPr id="2" name="幻灯片图像占位符 1"/>
+          <p:cNvSpPr>
+            <a:spLocks noGrp="1" noRot="1" noChangeAspect="1"/>
+          </p:cNvSpPr>
+          <p:nvPr>
+            <p:ph type="sldImg"/>
+          </p:nvPr>
+        </p:nvSpPr>
+        <p:spPr/>
+      </p:sp>
+      <p:sp>
+        <p:nvSpPr>
+          <p:cNvPr id="3" name="备注占位符 2"/>
+          <p:cNvSpPr>
+            <a:spLocks noGrp="1"/>
+          </p:cNvSpPr>
+          <p:nvPr>
+            <p:ph type="body" idx="1"/>
+          </p:nvPr>
+        </p:nvSpPr>
+        <p:spPr/>
+        <p:txBody>
+          <a:bodyPr/>
+          <a:lstStyle/>
+          <a:p>
+            <a:r>
+              <a:rPr lang="zh-CN" altLang="en-US" dirty="0"/>
+              <a:t>为了便于组员交流和编写程序，同时也方便与教员和班级其他小组沟通，我们小组的项目由我负责使用</a:t>
+            </a:r>
+            <a:r>
+              <a:rPr lang="en-US" altLang="zh-CN" dirty="0"/>
+              <a:t>Git</a:t>
+            </a:r>
+            <a:r>
+              <a:rPr lang="zh-CN" altLang="en-US" dirty="0"/>
+              <a:t>管理，同时在</a:t>
+            </a:r>
+            <a:r>
+              <a:rPr lang="en-US" altLang="zh-CN" dirty="0"/>
+              <a:t>GitHub</a:t>
+            </a:r>
+            <a:r>
+              <a:rPr lang="zh-CN" altLang="en-US" dirty="0"/>
+              <a:t>和</a:t>
+            </a:r>
+            <a:r>
+              <a:rPr lang="en-US" altLang="zh-CN" dirty="0" err="1"/>
+              <a:t>Gitee</a:t>
+            </a:r>
+            <a:r>
+              <a:rPr lang="zh-CN" altLang="en-US" dirty="0"/>
+              <a:t>两个平台上开源，现在已经可以访问。</a:t>
+            </a:r>
+          </a:p>
+        </p:txBody>
+      </p:sp>
+      <p:sp>
+        <p:nvSpPr>
+          <p:cNvPr id="4" name="灯片编号占位符 3"/>
+          <p:cNvSpPr>
+            <a:spLocks noGrp="1"/>
+          </p:cNvSpPr>
+          <p:nvPr>
+            <p:ph type="sldNum" sz="quarter" idx="5"/>
+          </p:nvPr>
+        </p:nvSpPr>
+        <p:spPr/>
+        <p:txBody>
+          <a:bodyPr/>
+          <a:lstStyle/>
+          <a:p>
+            <a:fld id="{2B8B2B85-DA0C-41B9-8C2D-3F95A2CB3C8E}" type="slidenum">
+              <a:rPr lang="zh-CN" altLang="en-US" smtClean="0"/>
+              <a:t>5</a:t>
+            </a:fld>
+            <a:endParaRPr lang="zh-CN" altLang="en-US"/>
+          </a:p>
+        </p:txBody>
+      </p:sp>
+    </p:spTree>
+    <p:extLst>
+      <p:ext uri="{BB962C8B-B14F-4D97-AF65-F5344CB8AC3E}">
+        <p14:creationId xmlns:p14="http://schemas.microsoft.com/office/powerpoint/2010/main" val="851406513"/>
+      </p:ext>
+    </p:extLst>
+  </p:cSld>
+  <p:clrMapOvr>
+    <a:masterClrMapping/>
+  </p:clrMapOvr>
+</p:notes>
 </file>
 
 <file path=ppt/slideLayouts/slideLayout1.xml><?xml version="1.0" encoding="utf-8"?>
@@ -3310,79 +3783,6 @@
   <p:cSld>
     <p:spTree>
       <p:nvGrpSpPr>
-        <p:cNvPr id="1" name=""/>
-        <p:cNvGrpSpPr/>
-        <p:nvPr/>
-      </p:nvGrpSpPr>
-      <p:grpSpPr>
-        <a:xfrm>
-          <a:off x="0" y="0"/>
-          <a:ext cx="0" cy="0"/>
-          <a:chOff x="0" y="0"/>
-          <a:chExt cx="0" cy="0"/>
-        </a:xfrm>
-      </p:grpSpPr>
-      <p:pic>
-        <p:nvPicPr>
-          <p:cNvPr id="6" name="图片 5">
-            <a:extLst>
-              <a:ext uri="{FF2B5EF4-FFF2-40B4-BE49-F238E27FC236}">
-                <a16:creationId xmlns:a16="http://schemas.microsoft.com/office/drawing/2014/main" id="{49B18683-F743-D26B-0514-72716B007B45}"/>
-              </a:ext>
-            </a:extLst>
-          </p:cNvPr>
-          <p:cNvPicPr>
-            <a:picLocks noChangeAspect="1"/>
-          </p:cNvPicPr>
-          <p:nvPr/>
-        </p:nvPicPr>
-        <p:blipFill>
-          <a:blip r:embed="rId2">
-            <a:extLst>
-              <a:ext uri="{28A0092B-C50C-407E-A947-70E740481C1C}">
-                <a14:useLocalDpi xmlns:a14="http://schemas.microsoft.com/office/drawing/2010/main" val="0"/>
-              </a:ext>
-            </a:extLst>
-          </a:blip>
-          <a:srcRect l="3408" t="3408" r="4547" b="4547"/>
-          <a:stretch/>
-        </p:blipFill>
-        <p:spPr>
-          <a:xfrm>
-            <a:off x="2900646" y="233646"/>
-            <a:ext cx="6312489" cy="6312489"/>
-          </a:xfrm>
-          <a:prstGeom prst="ellipse">
-            <a:avLst/>
-          </a:prstGeom>
-        </p:spPr>
-      </p:pic>
-    </p:spTree>
-    <p:extLst>
-      <p:ext uri="{BB962C8B-B14F-4D97-AF65-F5344CB8AC3E}">
-        <p14:creationId xmlns:p14="http://schemas.microsoft.com/office/powerpoint/2010/main" val="4024409103"/>
-      </p:ext>
-    </p:extLst>
-  </p:cSld>
-  <p:clrMapOvr>
-    <a:masterClrMapping/>
-  </p:clrMapOvr>
-  <mc:AlternateContent xmlns:mc="http://schemas.openxmlformats.org/markup-compatibility/2006">
-    <mc:Choice xmlns:p14="http://schemas.microsoft.com/office/powerpoint/2010/main" Requires="p14">
-      <p:transition p14:dur="0" advTm="0"/>
-    </mc:Choice>
-    <mc:Fallback>
-      <p:transition advTm="0"/>
-    </mc:Fallback>
-  </mc:AlternateContent>
-</p:sld>
-</file>
-
-<file path=ppt/slides/slide2.xml><?xml version="1.0" encoding="utf-8"?>
-<p:sld xmlns:a="http://schemas.openxmlformats.org/drawingml/2006/main" xmlns:r="http://schemas.openxmlformats.org/officeDocument/2006/relationships" xmlns:p="http://schemas.openxmlformats.org/presentationml/2006/main">
-  <p:cSld>
-    <p:spTree>
-      <p:nvGrpSpPr>
         <p:cNvPr id="1" name="">
           <a:extLst>
             <a:ext uri="{FF2B5EF4-FFF2-40B4-BE49-F238E27FC236}">
@@ -3417,32 +3817,116 @@
         </p:nvPicPr>
         <p:blipFill>
           <a:blip r:embed="rId2">
-            <a:alphaModFix amt="12000"/>
+            <a:alphaModFix/>
             <a:extLst>
               <a:ext uri="{28A0092B-C50C-407E-A947-70E740481C1C}">
                 <a14:useLocalDpi xmlns:a14="http://schemas.microsoft.com/office/drawing/2010/main" val="0"/>
               </a:ext>
             </a:extLst>
           </a:blip>
-          <a:srcRect l="3408" t="3408" r="4547" b="4547"/>
+          <a:srcRect l="4134" t="4134" r="4548" b="4548"/>
           <a:stretch/>
         </p:blipFill>
         <p:spPr>
           <a:xfrm>
-            <a:off x="2900646" y="233646"/>
-            <a:ext cx="6312489" cy="6312489"/>
+            <a:off x="2676524" y="3174"/>
+            <a:ext cx="6848981" cy="6848981"/>
           </a:xfrm>
           <a:prstGeom prst="ellipse">
             <a:avLst/>
           </a:prstGeom>
         </p:spPr>
       </p:pic>
+    </p:spTree>
+    <p:extLst>
+      <p:ext uri="{BB962C8B-B14F-4D97-AF65-F5344CB8AC3E}">
+        <p14:creationId xmlns:p14="http://schemas.microsoft.com/office/powerpoint/2010/main" val="2934233665"/>
+      </p:ext>
+    </p:extLst>
+  </p:cSld>
+  <p:clrMapOvr>
+    <a:masterClrMapping/>
+  </p:clrMapOvr>
+  <mc:AlternateContent xmlns:mc="http://schemas.openxmlformats.org/markup-compatibility/2006">
+    <mc:Choice xmlns:p159="http://schemas.microsoft.com/office/powerpoint/2015/09/main" Requires="p159">
+      <p:transition xmlns:p14="http://schemas.microsoft.com/office/powerpoint/2010/main" spd="slow" p14:dur="2000" advClick="0" advTm="0">
+        <p159:morph option="byObject"/>
+      </p:transition>
+    </mc:Choice>
+    <mc:Fallback>
+      <p:transition spd="slow" advClick="0" advTm="0">
+        <p:fade/>
+      </p:transition>
+    </mc:Fallback>
+  </mc:AlternateContent>
+</p:sld>
+</file>
+
+<file path=ppt/slides/slide2.xml><?xml version="1.0" encoding="utf-8"?>
+<p:sld xmlns:a="http://schemas.openxmlformats.org/drawingml/2006/main" xmlns:r="http://schemas.openxmlformats.org/officeDocument/2006/relationships" xmlns:p="http://schemas.openxmlformats.org/presentationml/2006/main">
+  <p:cSld>
+    <p:spTree>
+      <p:nvGrpSpPr>
+        <p:cNvPr id="1" name="">
+          <a:extLst>
+            <a:ext uri="{FF2B5EF4-FFF2-40B4-BE49-F238E27FC236}">
+              <a16:creationId xmlns:a16="http://schemas.microsoft.com/office/drawing/2014/main" id="{B1DC23B5-00A8-6ABD-7F99-1971F495CC33}"/>
+            </a:ext>
+          </a:extLst>
+        </p:cNvPr>
+        <p:cNvGrpSpPr/>
+        <p:nvPr/>
+      </p:nvGrpSpPr>
+      <p:grpSpPr>
+        <a:xfrm>
+          <a:off x="0" y="0"/>
+          <a:ext cx="0" cy="0"/>
+          <a:chOff x="0" y="0"/>
+          <a:chExt cx="0" cy="0"/>
+        </a:xfrm>
+      </p:grpSpPr>
+      <p:pic>
+        <p:nvPicPr>
+          <p:cNvPr id="6" name="图片 5">
+            <a:extLst>
+              <a:ext uri="{FF2B5EF4-FFF2-40B4-BE49-F238E27FC236}">
+                <a16:creationId xmlns:a16="http://schemas.microsoft.com/office/drawing/2014/main" id="{04336759-DEA4-D1F1-6F07-39AB52CA0D86}"/>
+              </a:ext>
+            </a:extLst>
+          </p:cNvPr>
+          <p:cNvPicPr>
+            <a:picLocks noChangeAspect="1"/>
+          </p:cNvPicPr>
+          <p:nvPr/>
+        </p:nvPicPr>
+        <p:blipFill>
+          <a:blip r:embed="rId2">
+            <a:alphaModFix amt="12000"/>
+            <a:extLst>
+              <a:ext uri="{28A0092B-C50C-407E-A947-70E740481C1C}">
+                <a14:useLocalDpi xmlns:a14="http://schemas.microsoft.com/office/drawing/2010/main" val="0"/>
+              </a:ext>
+            </a:extLst>
+          </a:blip>
+          <a:srcRect l="4134" t="4134" r="4548" b="4548"/>
+          <a:stretch/>
+        </p:blipFill>
+        <p:spPr>
+          <a:xfrm>
+            <a:off x="2676524" y="3174"/>
+            <a:ext cx="6848981" cy="6848981"/>
+          </a:xfrm>
+          <a:prstGeom prst="ellipse">
+            <a:avLst/>
+          </a:prstGeom>
+        </p:spPr>
+      </p:pic>
       <p:sp>
         <p:nvSpPr>
           <p:cNvPr id="2" name="文本框 1">
             <a:extLst>
               <a:ext uri="{FF2B5EF4-FFF2-40B4-BE49-F238E27FC236}">
-                <a16:creationId xmlns:a16="http://schemas.microsoft.com/office/drawing/2014/main" id="{35DA8F9D-B48E-9C3B-5980-CBD20A3B7881}"/>
+                <a16:creationId xmlns:a16="http://schemas.microsoft.com/office/drawing/2014/main" id="{D08493D7-C7B0-F4A4-BD6C-CBD961096966}"/>
               </a:ext>
             </a:extLst>
           </p:cNvPr>
@@ -3451,8 +3935,8 @@
         </p:nvSpPr>
         <p:spPr>
           <a:xfrm>
-            <a:off x="3245477" y="1699618"/>
-            <a:ext cx="5904964" cy="769441"/>
+            <a:off x="2839077" y="1578968"/>
+            <a:ext cx="6564642" cy="830997"/>
           </a:xfrm>
           <a:prstGeom prst="rect">
             <a:avLst/>
@@ -3465,8 +3949,9 @@
           </a:bodyPr>
           <a:lstStyle/>
           <a:p>
-            <a:r>
-              <a:rPr lang="zh-CN" altLang="en-US" sz="4400" b="1" dirty="0">
+            <a:pPr algn="ctr"/>
+            <a:r>
+              <a:rPr lang="zh-CN" altLang="en-US" sz="4800" b="1" dirty="0">
                 <a:latin typeface="+mn-ea"/>
               </a:rPr>
               <a:t>数字信号处理综合实验</a:t>
@@ -3479,7 +3964,7 @@
           <p:cNvPr id="3" name="文本框 2">
             <a:extLst>
               <a:ext uri="{FF2B5EF4-FFF2-40B4-BE49-F238E27FC236}">
-                <a16:creationId xmlns:a16="http://schemas.microsoft.com/office/drawing/2014/main" id="{A408CBDA-AD6A-5F76-3C24-51BC81A185A7}"/>
+                <a16:creationId xmlns:a16="http://schemas.microsoft.com/office/drawing/2014/main" id="{35EB7037-5F7D-DE3D-42AA-9E6FCDC15D0A}"/>
               </a:ext>
             </a:extLst>
           </p:cNvPr>
@@ -3488,8 +3973,8 @@
         </p:nvSpPr>
         <p:spPr>
           <a:xfrm>
-            <a:off x="3245477" y="2354295"/>
-            <a:ext cx="5904964" cy="707886"/>
+            <a:off x="3168916" y="2335245"/>
+            <a:ext cx="5904964" cy="769441"/>
           </a:xfrm>
           <a:prstGeom prst="rect">
             <a:avLst/>
@@ -3504,7 +3989,7 @@
           <a:p>
             <a:pPr algn="ctr"/>
             <a:r>
-              <a:rPr lang="zh-CN" altLang="en-US" sz="4000" dirty="0">
+              <a:rPr lang="zh-CN" altLang="en-US" sz="4400" dirty="0">
                 <a:latin typeface="+mn-ea"/>
               </a:rPr>
               <a:t>开题报告</a:t>
@@ -3512,10 +3997,3294 @@
           </a:p>
         </p:txBody>
       </p:sp>
+      <p:sp>
+        <p:nvSpPr>
+          <p:cNvPr id="4" name="文本框 3">
+            <a:extLst>
+              <a:ext uri="{FF2B5EF4-FFF2-40B4-BE49-F238E27FC236}">
+                <a16:creationId xmlns:a16="http://schemas.microsoft.com/office/drawing/2014/main" id="{556669E3-0589-1AE1-A25A-B7DF9BE243E0}"/>
+              </a:ext>
+            </a:extLst>
+          </p:cNvPr>
+          <p:cNvSpPr txBox="1"/>
+          <p:nvPr/>
+        </p:nvSpPr>
+        <p:spPr>
+          <a:xfrm>
+            <a:off x="3168916" y="3230095"/>
+            <a:ext cx="5904964" cy="523220"/>
+          </a:xfrm>
+          <a:prstGeom prst="rect">
+            <a:avLst/>
+          </a:prstGeom>
+          <a:noFill/>
+        </p:spPr>
+        <p:txBody>
+          <a:bodyPr wrap="square" rtlCol="0">
+            <a:spAutoFit/>
+          </a:bodyPr>
+          <a:lstStyle/>
+          <a:p>
+            <a:pPr algn="ctr"/>
+            <a:r>
+              <a:rPr lang="zh-CN" altLang="en-US" sz="2800" b="1" dirty="0">
+                <a:latin typeface="+mn-ea"/>
+              </a:rPr>
+              <a:t>第</a:t>
+            </a:r>
+            <a:r>
+              <a:rPr lang="en-US" altLang="zh-CN" sz="2800" b="1" dirty="0">
+                <a:latin typeface="+mn-ea"/>
+              </a:rPr>
+              <a:t>5</a:t>
+            </a:r>
+            <a:r>
+              <a:rPr lang="zh-CN" altLang="en-US" sz="2800" b="1" dirty="0">
+                <a:latin typeface="+mn-ea"/>
+              </a:rPr>
+              <a:t>组</a:t>
+            </a:r>
+          </a:p>
+        </p:txBody>
+      </p:sp>
+      <p:sp>
+        <p:nvSpPr>
+          <p:cNvPr id="5" name="文本框 4">
+            <a:extLst>
+              <a:ext uri="{FF2B5EF4-FFF2-40B4-BE49-F238E27FC236}">
+                <a16:creationId xmlns:a16="http://schemas.microsoft.com/office/drawing/2014/main" id="{618D033D-57EB-4F84-BD6B-CDAF98098C06}"/>
+              </a:ext>
+            </a:extLst>
+          </p:cNvPr>
+          <p:cNvSpPr txBox="1"/>
+          <p:nvPr/>
+        </p:nvSpPr>
+        <p:spPr>
+          <a:xfrm>
+            <a:off x="768616" y="3647891"/>
+            <a:ext cx="5904964" cy="2308324"/>
+          </a:xfrm>
+          <a:prstGeom prst="rect">
+            <a:avLst/>
+          </a:prstGeom>
+          <a:noFill/>
+        </p:spPr>
+        <p:txBody>
+          <a:bodyPr wrap="square" rtlCol="0">
+            <a:spAutoFit/>
+          </a:bodyPr>
+          <a:lstStyle/>
+          <a:p>
+            <a:pPr algn="r"/>
+            <a:r>
+              <a:rPr lang="zh-CN" altLang="en-US" sz="2400" dirty="0">
+                <a:latin typeface="+mn-ea"/>
+              </a:rPr>
+              <a:t>组长</a:t>
+            </a:r>
+            <a:r>
+              <a:rPr lang="en-US" altLang="zh-CN" sz="2400" dirty="0">
+                <a:latin typeface="+mn-ea"/>
+              </a:rPr>
+              <a:t>/</a:t>
+            </a:r>
+            <a:r>
+              <a:rPr lang="zh-CN" altLang="en-US" sz="2400" dirty="0">
+                <a:latin typeface="+mn-ea"/>
+              </a:rPr>
+              <a:t>汇报人：李涵哲</a:t>
+            </a:r>
+            <a:endParaRPr lang="en-US" altLang="zh-CN" sz="2400" dirty="0">
+              <a:latin typeface="+mn-ea"/>
+            </a:endParaRPr>
+          </a:p>
+          <a:p>
+            <a:pPr algn="r"/>
+            <a:r>
+              <a:rPr lang="zh-CN" altLang="en-US" sz="2400" dirty="0">
+                <a:latin typeface="+mn-ea"/>
+              </a:rPr>
+              <a:t>组员：谭迪文</a:t>
+            </a:r>
+            <a:endParaRPr lang="en-US" altLang="zh-CN" sz="2400" dirty="0">
+              <a:latin typeface="+mn-ea"/>
+            </a:endParaRPr>
+          </a:p>
+          <a:p>
+            <a:pPr algn="r"/>
+            <a:r>
+              <a:rPr lang="zh-CN" altLang="en-US" sz="2400" dirty="0">
+                <a:latin typeface="+mn-ea"/>
+              </a:rPr>
+              <a:t>赵佳然</a:t>
+            </a:r>
+            <a:endParaRPr lang="en-US" altLang="zh-CN" sz="2400" dirty="0">
+              <a:latin typeface="+mn-ea"/>
+            </a:endParaRPr>
+          </a:p>
+          <a:p>
+            <a:pPr algn="r"/>
+            <a:r>
+              <a:rPr lang="zh-CN" altLang="en-US" sz="2400" dirty="0">
+                <a:latin typeface="+mn-ea"/>
+              </a:rPr>
+              <a:t>王奕凡</a:t>
+            </a:r>
+            <a:endParaRPr lang="en-US" altLang="zh-CN" sz="2400" dirty="0">
+              <a:latin typeface="+mn-ea"/>
+            </a:endParaRPr>
+          </a:p>
+          <a:p>
+            <a:pPr algn="r"/>
+            <a:r>
+              <a:rPr lang="zh-CN" altLang="en-US" sz="2400" dirty="0">
+                <a:latin typeface="+mn-ea"/>
+              </a:rPr>
+              <a:t>龙任腾</a:t>
+            </a:r>
+            <a:endParaRPr lang="en-US" altLang="zh-CN" sz="2400" dirty="0">
+              <a:latin typeface="+mn-ea"/>
+            </a:endParaRPr>
+          </a:p>
+          <a:p>
+            <a:pPr algn="r"/>
+            <a:r>
+              <a:rPr lang="zh-CN" altLang="en-US" sz="2400" dirty="0">
+                <a:latin typeface="+mn-ea"/>
+              </a:rPr>
+              <a:t>杨   丞</a:t>
+            </a:r>
+          </a:p>
+        </p:txBody>
+      </p:sp>
     </p:spTree>
     <p:extLst>
       <p:ext uri="{BB962C8B-B14F-4D97-AF65-F5344CB8AC3E}">
-        <p14:creationId xmlns:p14="http://schemas.microsoft.com/office/powerpoint/2010/main" val="2934233665"/>
+        <p14:creationId xmlns:p14="http://schemas.microsoft.com/office/powerpoint/2010/main" val="3698786197"/>
+      </p:ext>
+    </p:extLst>
+  </p:cSld>
+  <p:clrMapOvr>
+    <a:masterClrMapping/>
+  </p:clrMapOvr>
+  <mc:AlternateContent xmlns:mc="http://schemas.openxmlformats.org/markup-compatibility/2006">
+    <mc:Choice xmlns:p159="http://schemas.microsoft.com/office/powerpoint/2015/09/main" Requires="p159">
+      <p:transition xmlns:p14="http://schemas.microsoft.com/office/powerpoint/2010/main" spd="slow" p14:dur="2000">
+        <p159:morph option="byObject"/>
+      </p:transition>
+    </mc:Choice>
+    <mc:Fallback>
+      <p:transition spd="slow">
+        <p:fade/>
+      </p:transition>
+    </mc:Fallback>
+  </mc:AlternateContent>
+</p:sld>
+</file>
+
+<file path=ppt/slides/slide3.xml><?xml version="1.0" encoding="utf-8"?>
+<p:sld xmlns:a="http://schemas.openxmlformats.org/drawingml/2006/main" xmlns:r="http://schemas.openxmlformats.org/officeDocument/2006/relationships" xmlns:p="http://schemas.openxmlformats.org/presentationml/2006/main">
+  <p:cSld>
+    <p:spTree>
+      <p:nvGrpSpPr>
+        <p:cNvPr id="1" name="">
+          <a:extLst>
+            <a:ext uri="{FF2B5EF4-FFF2-40B4-BE49-F238E27FC236}">
+              <a16:creationId xmlns:a16="http://schemas.microsoft.com/office/drawing/2014/main" id="{D7EE66DD-65A3-2DBA-71D3-FED7C872792B}"/>
+            </a:ext>
+          </a:extLst>
+        </p:cNvPr>
+        <p:cNvGrpSpPr/>
+        <p:nvPr/>
+      </p:nvGrpSpPr>
+      <p:grpSpPr>
+        <a:xfrm>
+          <a:off x="0" y="0"/>
+          <a:ext cx="0" cy="0"/>
+          <a:chOff x="0" y="0"/>
+          <a:chExt cx="0" cy="0"/>
+        </a:xfrm>
+      </p:grpSpPr>
+      <p:pic>
+        <p:nvPicPr>
+          <p:cNvPr id="6" name="图片 5">
+            <a:extLst>
+              <a:ext uri="{FF2B5EF4-FFF2-40B4-BE49-F238E27FC236}">
+                <a16:creationId xmlns:a16="http://schemas.microsoft.com/office/drawing/2014/main" id="{73589062-8AC9-6831-4226-7979F7F29F0E}"/>
+              </a:ext>
+            </a:extLst>
+          </p:cNvPr>
+          <p:cNvPicPr>
+            <a:picLocks noChangeAspect="1"/>
+          </p:cNvPicPr>
+          <p:nvPr/>
+        </p:nvPicPr>
+        <p:blipFill>
+          <a:blip r:embed="rId2">
+            <a:alphaModFix amt="50000"/>
+            <a:extLst>
+              <a:ext uri="{28A0092B-C50C-407E-A947-70E740481C1C}">
+                <a14:useLocalDpi xmlns:a14="http://schemas.microsoft.com/office/drawing/2010/main" val="0"/>
+              </a:ext>
+            </a:extLst>
+          </a:blip>
+          <a:srcRect l="4134" t="4134" r="4548" b="4548"/>
+          <a:stretch/>
+        </p:blipFill>
+        <p:spPr>
+          <a:xfrm>
+            <a:off x="-3444876" y="3174"/>
+            <a:ext cx="6848981" cy="6848981"/>
+          </a:xfrm>
+          <a:prstGeom prst="ellipse">
+            <a:avLst/>
+          </a:prstGeom>
+        </p:spPr>
+      </p:pic>
+      <p:sp>
+        <p:nvSpPr>
+          <p:cNvPr id="2" name="文本框 1">
+            <a:extLst>
+              <a:ext uri="{FF2B5EF4-FFF2-40B4-BE49-F238E27FC236}">
+                <a16:creationId xmlns:a16="http://schemas.microsoft.com/office/drawing/2014/main" id="{E3B3F1E4-8C33-BE3C-5992-2C2E8BE7DD27}"/>
+              </a:ext>
+            </a:extLst>
+          </p:cNvPr>
+          <p:cNvSpPr txBox="1"/>
+          <p:nvPr/>
+        </p:nvSpPr>
+        <p:spPr>
+          <a:xfrm>
+            <a:off x="4172216" y="1430473"/>
+            <a:ext cx="1269734" cy="707886"/>
+          </a:xfrm>
+          <a:prstGeom prst="rect">
+            <a:avLst/>
+          </a:prstGeom>
+          <a:noFill/>
+        </p:spPr>
+        <p:txBody>
+          <a:bodyPr wrap="square" rtlCol="0">
+            <a:spAutoFit/>
+          </a:bodyPr>
+          <a:lstStyle/>
+          <a:p>
+            <a:pPr algn="ctr"/>
+            <a:r>
+              <a:rPr lang="zh-CN" altLang="en-US" sz="4000" b="1" dirty="0">
+                <a:latin typeface="+mn-ea"/>
+              </a:rPr>
+              <a:t>目录</a:t>
+            </a:r>
+          </a:p>
+        </p:txBody>
+      </p:sp>
+      <p:sp>
+        <p:nvSpPr>
+          <p:cNvPr id="3" name="文本框 2">
+            <a:extLst>
+              <a:ext uri="{FF2B5EF4-FFF2-40B4-BE49-F238E27FC236}">
+                <a16:creationId xmlns:a16="http://schemas.microsoft.com/office/drawing/2014/main" id="{9BE891CF-4F30-D13A-741B-639D91DF8F68}"/>
+              </a:ext>
+            </a:extLst>
+          </p:cNvPr>
+          <p:cNvSpPr txBox="1"/>
+          <p:nvPr/>
+        </p:nvSpPr>
+        <p:spPr>
+          <a:xfrm>
+            <a:off x="4210316" y="2192231"/>
+            <a:ext cx="2888984" cy="584775"/>
+          </a:xfrm>
+          <a:prstGeom prst="rect">
+            <a:avLst/>
+          </a:prstGeom>
+          <a:noFill/>
+        </p:spPr>
+        <p:txBody>
+          <a:bodyPr wrap="square" rtlCol="0">
+            <a:spAutoFit/>
+          </a:bodyPr>
+          <a:lstStyle/>
+          <a:p>
+            <a:r>
+              <a:rPr lang="zh-CN" altLang="en-US" sz="3200" dirty="0">
+                <a:latin typeface="+mn-ea"/>
+              </a:rPr>
+              <a:t>总体规划</a:t>
+            </a:r>
+          </a:p>
+        </p:txBody>
+      </p:sp>
+      <p:sp>
+        <p:nvSpPr>
+          <p:cNvPr id="4" name="文本框 3">
+            <a:extLst>
+              <a:ext uri="{FF2B5EF4-FFF2-40B4-BE49-F238E27FC236}">
+                <a16:creationId xmlns:a16="http://schemas.microsoft.com/office/drawing/2014/main" id="{A2170D15-4659-681F-F35D-FCEF3E2B17D8}"/>
+              </a:ext>
+            </a:extLst>
+          </p:cNvPr>
+          <p:cNvSpPr txBox="1"/>
+          <p:nvPr/>
+        </p:nvSpPr>
+        <p:spPr>
+          <a:xfrm>
+            <a:off x="4210316" y="2763475"/>
+            <a:ext cx="2888984" cy="584775"/>
+          </a:xfrm>
+          <a:prstGeom prst="rect">
+            <a:avLst/>
+          </a:prstGeom>
+          <a:noFill/>
+        </p:spPr>
+        <p:txBody>
+          <a:bodyPr wrap="square" rtlCol="0">
+            <a:spAutoFit/>
+          </a:bodyPr>
+          <a:lstStyle/>
+          <a:p>
+            <a:r>
+              <a:rPr lang="zh-CN" altLang="en-US" sz="3200" dirty="0">
+                <a:latin typeface="+mn-ea"/>
+              </a:rPr>
+              <a:t>项目分工</a:t>
+            </a:r>
+          </a:p>
+        </p:txBody>
+      </p:sp>
+      <p:sp>
+        <p:nvSpPr>
+          <p:cNvPr id="5" name="文本框 4">
+            <a:extLst>
+              <a:ext uri="{FF2B5EF4-FFF2-40B4-BE49-F238E27FC236}">
+                <a16:creationId xmlns:a16="http://schemas.microsoft.com/office/drawing/2014/main" id="{D0C8E7BE-90AE-58EB-B1C0-E3CCD67BECCB}"/>
+              </a:ext>
+            </a:extLst>
+          </p:cNvPr>
+          <p:cNvSpPr txBox="1"/>
+          <p:nvPr/>
+        </p:nvSpPr>
+        <p:spPr>
+          <a:xfrm>
+            <a:off x="4210316" y="3334719"/>
+            <a:ext cx="2888984" cy="584775"/>
+          </a:xfrm>
+          <a:prstGeom prst="rect">
+            <a:avLst/>
+          </a:prstGeom>
+          <a:noFill/>
+        </p:spPr>
+        <p:txBody>
+          <a:bodyPr wrap="square" rtlCol="0">
+            <a:spAutoFit/>
+          </a:bodyPr>
+          <a:lstStyle/>
+          <a:p>
+            <a:r>
+              <a:rPr lang="zh-CN" altLang="en-US" sz="3200" dirty="0">
+                <a:latin typeface="+mn-ea"/>
+              </a:rPr>
+              <a:t>分项情况</a:t>
+            </a:r>
+          </a:p>
+        </p:txBody>
+      </p:sp>
+      <p:sp>
+        <p:nvSpPr>
+          <p:cNvPr id="7" name="文本框 6">
+            <a:extLst>
+              <a:ext uri="{FF2B5EF4-FFF2-40B4-BE49-F238E27FC236}">
+                <a16:creationId xmlns:a16="http://schemas.microsoft.com/office/drawing/2014/main" id="{D89A9BFD-E492-0273-DFE3-CCE79A91F3F2}"/>
+              </a:ext>
+            </a:extLst>
+          </p:cNvPr>
+          <p:cNvSpPr txBox="1"/>
+          <p:nvPr/>
+        </p:nvSpPr>
+        <p:spPr>
+          <a:xfrm>
+            <a:off x="4210316" y="3905963"/>
+            <a:ext cx="2888984" cy="584775"/>
+          </a:xfrm>
+          <a:prstGeom prst="rect">
+            <a:avLst/>
+          </a:prstGeom>
+          <a:noFill/>
+        </p:spPr>
+        <p:txBody>
+          <a:bodyPr wrap="square" rtlCol="0">
+            <a:spAutoFit/>
+          </a:bodyPr>
+          <a:lstStyle/>
+          <a:p>
+            <a:r>
+              <a:rPr lang="zh-CN" altLang="en-US" sz="3200" dirty="0">
+                <a:latin typeface="+mn-ea"/>
+              </a:rPr>
+              <a:t>后续计划</a:t>
+            </a:r>
+          </a:p>
+        </p:txBody>
+      </p:sp>
+      <p:sp>
+        <p:nvSpPr>
+          <p:cNvPr id="8" name="文本框 7">
+            <a:extLst>
+              <a:ext uri="{FF2B5EF4-FFF2-40B4-BE49-F238E27FC236}">
+                <a16:creationId xmlns:a16="http://schemas.microsoft.com/office/drawing/2014/main" id="{8F29AD0E-D9F0-4E9D-B169-7C6DFEED7551}"/>
+              </a:ext>
+            </a:extLst>
+          </p:cNvPr>
+          <p:cNvSpPr txBox="1"/>
+          <p:nvPr/>
+        </p:nvSpPr>
+        <p:spPr>
+          <a:xfrm>
+            <a:off x="4210316" y="4477207"/>
+            <a:ext cx="2888984" cy="584775"/>
+          </a:xfrm>
+          <a:prstGeom prst="rect">
+            <a:avLst/>
+          </a:prstGeom>
+          <a:noFill/>
+        </p:spPr>
+        <p:txBody>
+          <a:bodyPr wrap="square" rtlCol="0">
+            <a:spAutoFit/>
+          </a:bodyPr>
+          <a:lstStyle/>
+          <a:p>
+            <a:r>
+              <a:rPr lang="zh-CN" altLang="en-US" sz="3200" dirty="0">
+                <a:latin typeface="+mn-ea"/>
+              </a:rPr>
+              <a:t>参考资料</a:t>
+            </a:r>
+          </a:p>
+        </p:txBody>
+      </p:sp>
+      <p:sp>
+        <p:nvSpPr>
+          <p:cNvPr id="10" name="文本框 9">
+            <a:extLst>
+              <a:ext uri="{FF2B5EF4-FFF2-40B4-BE49-F238E27FC236}">
+                <a16:creationId xmlns:a16="http://schemas.microsoft.com/office/drawing/2014/main" id="{315ED129-9EA2-759C-F043-3E9E980728E2}"/>
+              </a:ext>
+            </a:extLst>
+          </p:cNvPr>
+          <p:cNvSpPr txBox="1"/>
+          <p:nvPr/>
+        </p:nvSpPr>
+        <p:spPr>
+          <a:xfrm>
+            <a:off x="4210316" y="5048450"/>
+            <a:ext cx="2888984" cy="584775"/>
+          </a:xfrm>
+          <a:prstGeom prst="rect">
+            <a:avLst/>
+          </a:prstGeom>
+          <a:noFill/>
+        </p:spPr>
+        <p:txBody>
+          <a:bodyPr wrap="square" rtlCol="0">
+            <a:spAutoFit/>
+          </a:bodyPr>
+          <a:lstStyle/>
+          <a:p>
+            <a:r>
+              <a:rPr lang="zh-CN" altLang="en-US" sz="3200" dirty="0">
+                <a:latin typeface="+mn-ea"/>
+              </a:rPr>
+              <a:t>致谢</a:t>
+            </a:r>
+          </a:p>
+        </p:txBody>
+      </p:sp>
+      <p:sp>
+        <p:nvSpPr>
+          <p:cNvPr id="11" name="文本框 10">
+            <a:extLst>
+              <a:ext uri="{FF2B5EF4-FFF2-40B4-BE49-F238E27FC236}">
+                <a16:creationId xmlns:a16="http://schemas.microsoft.com/office/drawing/2014/main" id="{7AE2F9DE-909C-A548-72C7-132706FCBCBA}"/>
+              </a:ext>
+            </a:extLst>
+          </p:cNvPr>
+          <p:cNvSpPr txBox="1"/>
+          <p:nvPr/>
+        </p:nvSpPr>
+        <p:spPr>
+          <a:xfrm>
+            <a:off x="3896574" y="2346120"/>
+            <a:ext cx="481673" cy="307777"/>
+          </a:xfrm>
+          <a:prstGeom prst="rect">
+            <a:avLst/>
+          </a:prstGeom>
+          <a:noFill/>
+        </p:spPr>
+        <p:txBody>
+          <a:bodyPr wrap="square" rtlCol="0">
+            <a:spAutoFit/>
+          </a:bodyPr>
+          <a:lstStyle/>
+          <a:p>
+            <a:r>
+              <a:rPr lang="zh-CN" altLang="en-US" sz="1400" dirty="0"/>
+              <a:t>●</a:t>
+            </a:r>
+            <a:endParaRPr lang="zh-CN" altLang="en-US" sz="1600" dirty="0"/>
+          </a:p>
+        </p:txBody>
+      </p:sp>
+      <p:sp>
+        <p:nvSpPr>
+          <p:cNvPr id="13" name="文本框 12">
+            <a:extLst>
+              <a:ext uri="{FF2B5EF4-FFF2-40B4-BE49-F238E27FC236}">
+                <a16:creationId xmlns:a16="http://schemas.microsoft.com/office/drawing/2014/main" id="{9477A4D9-E274-F132-076C-833DBA1B90AC}"/>
+              </a:ext>
+            </a:extLst>
+          </p:cNvPr>
+          <p:cNvSpPr txBox="1"/>
+          <p:nvPr/>
+        </p:nvSpPr>
+        <p:spPr>
+          <a:xfrm>
+            <a:off x="3896574" y="2916943"/>
+            <a:ext cx="481673" cy="307777"/>
+          </a:xfrm>
+          <a:prstGeom prst="rect">
+            <a:avLst/>
+          </a:prstGeom>
+          <a:noFill/>
+        </p:spPr>
+        <p:txBody>
+          <a:bodyPr wrap="square" rtlCol="0">
+            <a:spAutoFit/>
+          </a:bodyPr>
+          <a:lstStyle/>
+          <a:p>
+            <a:r>
+              <a:rPr lang="zh-CN" altLang="en-US" sz="1400" dirty="0"/>
+              <a:t>●</a:t>
+            </a:r>
+            <a:endParaRPr lang="zh-CN" altLang="en-US" sz="1600" dirty="0"/>
+          </a:p>
+        </p:txBody>
+      </p:sp>
+      <p:sp>
+        <p:nvSpPr>
+          <p:cNvPr id="14" name="文本框 13">
+            <a:extLst>
+              <a:ext uri="{FF2B5EF4-FFF2-40B4-BE49-F238E27FC236}">
+                <a16:creationId xmlns:a16="http://schemas.microsoft.com/office/drawing/2014/main" id="{0A422A9A-6DA8-DB63-5C44-B7DF860674CA}"/>
+              </a:ext>
+            </a:extLst>
+          </p:cNvPr>
+          <p:cNvSpPr txBox="1"/>
+          <p:nvPr/>
+        </p:nvSpPr>
+        <p:spPr>
+          <a:xfrm>
+            <a:off x="3896574" y="3488607"/>
+            <a:ext cx="481673" cy="307777"/>
+          </a:xfrm>
+          <a:prstGeom prst="rect">
+            <a:avLst/>
+          </a:prstGeom>
+          <a:noFill/>
+        </p:spPr>
+        <p:txBody>
+          <a:bodyPr wrap="square" rtlCol="0">
+            <a:spAutoFit/>
+          </a:bodyPr>
+          <a:lstStyle/>
+          <a:p>
+            <a:r>
+              <a:rPr lang="zh-CN" altLang="en-US" sz="1400" dirty="0"/>
+              <a:t>●</a:t>
+            </a:r>
+            <a:endParaRPr lang="zh-CN" altLang="en-US" sz="1600" dirty="0"/>
+          </a:p>
+        </p:txBody>
+      </p:sp>
+      <p:sp>
+        <p:nvSpPr>
+          <p:cNvPr id="15" name="文本框 14">
+            <a:extLst>
+              <a:ext uri="{FF2B5EF4-FFF2-40B4-BE49-F238E27FC236}">
+                <a16:creationId xmlns:a16="http://schemas.microsoft.com/office/drawing/2014/main" id="{0B422443-62E1-636F-E3EF-C93F37583C24}"/>
+              </a:ext>
+            </a:extLst>
+          </p:cNvPr>
+          <p:cNvSpPr txBox="1"/>
+          <p:nvPr/>
+        </p:nvSpPr>
+        <p:spPr>
+          <a:xfrm>
+            <a:off x="3896574" y="4059851"/>
+            <a:ext cx="481673" cy="307777"/>
+          </a:xfrm>
+          <a:prstGeom prst="rect">
+            <a:avLst/>
+          </a:prstGeom>
+          <a:noFill/>
+        </p:spPr>
+        <p:txBody>
+          <a:bodyPr wrap="square" rtlCol="0">
+            <a:spAutoFit/>
+          </a:bodyPr>
+          <a:lstStyle/>
+          <a:p>
+            <a:r>
+              <a:rPr lang="zh-CN" altLang="en-US" sz="1400" dirty="0"/>
+              <a:t>●</a:t>
+            </a:r>
+            <a:endParaRPr lang="zh-CN" altLang="en-US" sz="1600" dirty="0"/>
+          </a:p>
+        </p:txBody>
+      </p:sp>
+      <p:sp>
+        <p:nvSpPr>
+          <p:cNvPr id="16" name="文本框 15">
+            <a:extLst>
+              <a:ext uri="{FF2B5EF4-FFF2-40B4-BE49-F238E27FC236}">
+                <a16:creationId xmlns:a16="http://schemas.microsoft.com/office/drawing/2014/main" id="{88D197D7-3790-F3EA-E9C9-A1009680DEEC}"/>
+              </a:ext>
+            </a:extLst>
+          </p:cNvPr>
+          <p:cNvSpPr txBox="1"/>
+          <p:nvPr/>
+        </p:nvSpPr>
+        <p:spPr>
+          <a:xfrm>
+            <a:off x="3896574" y="4631095"/>
+            <a:ext cx="481673" cy="307777"/>
+          </a:xfrm>
+          <a:prstGeom prst="rect">
+            <a:avLst/>
+          </a:prstGeom>
+          <a:noFill/>
+        </p:spPr>
+        <p:txBody>
+          <a:bodyPr wrap="square" rtlCol="0">
+            <a:spAutoFit/>
+          </a:bodyPr>
+          <a:lstStyle/>
+          <a:p>
+            <a:r>
+              <a:rPr lang="zh-CN" altLang="en-US" sz="1400" dirty="0"/>
+              <a:t>●</a:t>
+            </a:r>
+            <a:endParaRPr lang="zh-CN" altLang="en-US" sz="1600" dirty="0"/>
+          </a:p>
+        </p:txBody>
+      </p:sp>
+      <p:sp>
+        <p:nvSpPr>
+          <p:cNvPr id="17" name="文本框 16">
+            <a:extLst>
+              <a:ext uri="{FF2B5EF4-FFF2-40B4-BE49-F238E27FC236}">
+                <a16:creationId xmlns:a16="http://schemas.microsoft.com/office/drawing/2014/main" id="{D4AEEE93-EA1F-95A1-5903-BD222E6404CC}"/>
+              </a:ext>
+            </a:extLst>
+          </p:cNvPr>
+          <p:cNvSpPr txBox="1"/>
+          <p:nvPr/>
+        </p:nvSpPr>
+        <p:spPr>
+          <a:xfrm>
+            <a:off x="3896574" y="5202338"/>
+            <a:ext cx="481673" cy="307777"/>
+          </a:xfrm>
+          <a:prstGeom prst="rect">
+            <a:avLst/>
+          </a:prstGeom>
+          <a:noFill/>
+        </p:spPr>
+        <p:txBody>
+          <a:bodyPr wrap="square" rtlCol="0">
+            <a:spAutoFit/>
+          </a:bodyPr>
+          <a:lstStyle/>
+          <a:p>
+            <a:r>
+              <a:rPr lang="zh-CN" altLang="en-US" sz="1400" dirty="0"/>
+              <a:t>●</a:t>
+            </a:r>
+            <a:endParaRPr lang="zh-CN" altLang="en-US" sz="1600" dirty="0"/>
+          </a:p>
+        </p:txBody>
+      </p:sp>
+    </p:spTree>
+    <p:extLst>
+      <p:ext uri="{BB962C8B-B14F-4D97-AF65-F5344CB8AC3E}">
+        <p14:creationId xmlns:p14="http://schemas.microsoft.com/office/powerpoint/2010/main" val="3119280425"/>
+      </p:ext>
+    </p:extLst>
+  </p:cSld>
+  <p:clrMapOvr>
+    <a:masterClrMapping/>
+  </p:clrMapOvr>
+  <mc:AlternateContent xmlns:mc="http://schemas.openxmlformats.org/markup-compatibility/2006">
+    <mc:Choice xmlns:p159="http://schemas.microsoft.com/office/powerpoint/2015/09/main" Requires="p159">
+      <p:transition xmlns:p14="http://schemas.microsoft.com/office/powerpoint/2010/main" spd="slow" p14:dur="2000">
+        <p159:morph option="byObject"/>
+      </p:transition>
+    </mc:Choice>
+    <mc:Fallback>
+      <p:transition spd="slow">
+        <p:fade/>
+      </p:transition>
+    </mc:Fallback>
+  </mc:AlternateContent>
+</p:sld>
+</file>
+
+<file path=ppt/slides/slide4.xml><?xml version="1.0" encoding="utf-8"?>
+<p:sld xmlns:a="http://schemas.openxmlformats.org/drawingml/2006/main" xmlns:r="http://schemas.openxmlformats.org/officeDocument/2006/relationships" xmlns:p="http://schemas.openxmlformats.org/presentationml/2006/main">
+  <p:cSld>
+    <p:spTree>
+      <p:nvGrpSpPr>
+        <p:cNvPr id="1" name="">
+          <a:extLst>
+            <a:ext uri="{FF2B5EF4-FFF2-40B4-BE49-F238E27FC236}">
+              <a16:creationId xmlns:a16="http://schemas.microsoft.com/office/drawing/2014/main" id="{F233D8B6-EB7D-B8BD-5DB9-F4FF919A9BE0}"/>
+            </a:ext>
+          </a:extLst>
+        </p:cNvPr>
+        <p:cNvGrpSpPr/>
+        <p:nvPr/>
+      </p:nvGrpSpPr>
+      <p:grpSpPr>
+        <a:xfrm>
+          <a:off x="0" y="0"/>
+          <a:ext cx="0" cy="0"/>
+          <a:chOff x="0" y="0"/>
+          <a:chExt cx="0" cy="0"/>
+        </a:xfrm>
+      </p:grpSpPr>
+      <p:pic>
+        <p:nvPicPr>
+          <p:cNvPr id="6" name="图片 5">
+            <a:extLst>
+              <a:ext uri="{FF2B5EF4-FFF2-40B4-BE49-F238E27FC236}">
+                <a16:creationId xmlns:a16="http://schemas.microsoft.com/office/drawing/2014/main" id="{BB33EEF1-DA92-DEC5-8688-7EE604A236F2}"/>
+              </a:ext>
+            </a:extLst>
+          </p:cNvPr>
+          <p:cNvPicPr>
+            <a:picLocks noChangeAspect="1"/>
+          </p:cNvPicPr>
+          <p:nvPr/>
+        </p:nvPicPr>
+        <p:blipFill>
+          <a:blip r:embed="rId2">
+            <a:alphaModFix amt="85000"/>
+            <a:extLst>
+              <a:ext uri="{28A0092B-C50C-407E-A947-70E740481C1C}">
+                <a14:useLocalDpi xmlns:a14="http://schemas.microsoft.com/office/drawing/2010/main" val="0"/>
+              </a:ext>
+            </a:extLst>
+          </a:blip>
+          <a:srcRect l="4134" t="4134" r="4548" b="4548"/>
+          <a:stretch/>
+        </p:blipFill>
+        <p:spPr>
+          <a:xfrm>
+            <a:off x="63500" y="63500"/>
+            <a:ext cx="900000" cy="900000"/>
+          </a:xfrm>
+          <a:prstGeom prst="ellipse">
+            <a:avLst/>
+          </a:prstGeom>
+        </p:spPr>
+      </p:pic>
+      <p:sp>
+        <p:nvSpPr>
+          <p:cNvPr id="3" name="文本框 2">
+            <a:extLst>
+              <a:ext uri="{FF2B5EF4-FFF2-40B4-BE49-F238E27FC236}">
+                <a16:creationId xmlns:a16="http://schemas.microsoft.com/office/drawing/2014/main" id="{DAF6693E-B855-AF16-B785-B88469DDA022}"/>
+              </a:ext>
+            </a:extLst>
+          </p:cNvPr>
+          <p:cNvSpPr txBox="1"/>
+          <p:nvPr/>
+        </p:nvSpPr>
+        <p:spPr>
+          <a:xfrm>
+            <a:off x="963500" y="221112"/>
+            <a:ext cx="2888984" cy="584775"/>
+          </a:xfrm>
+          <a:prstGeom prst="rect">
+            <a:avLst/>
+          </a:prstGeom>
+          <a:noFill/>
+        </p:spPr>
+        <p:txBody>
+          <a:bodyPr wrap="square" rtlCol="0">
+            <a:spAutoFit/>
+          </a:bodyPr>
+          <a:lstStyle/>
+          <a:p>
+            <a:r>
+              <a:rPr lang="zh-CN" altLang="en-US" sz="3200" b="1" dirty="0">
+                <a:latin typeface="+mn-ea"/>
+              </a:rPr>
+              <a:t>总体规划</a:t>
+            </a:r>
+          </a:p>
+        </p:txBody>
+      </p:sp>
+      <p:sp>
+        <p:nvSpPr>
+          <p:cNvPr id="9" name="文本框 8">
+            <a:extLst>
+              <a:ext uri="{FF2B5EF4-FFF2-40B4-BE49-F238E27FC236}">
+                <a16:creationId xmlns:a16="http://schemas.microsoft.com/office/drawing/2014/main" id="{4E609403-10AB-3E7B-B861-4C51493CA0F5}"/>
+              </a:ext>
+            </a:extLst>
+          </p:cNvPr>
+          <p:cNvSpPr txBox="1"/>
+          <p:nvPr/>
+        </p:nvSpPr>
+        <p:spPr>
+          <a:xfrm>
+            <a:off x="1200150" y="1219763"/>
+            <a:ext cx="4991100" cy="461665"/>
+          </a:xfrm>
+          <a:prstGeom prst="rect">
+            <a:avLst/>
+          </a:prstGeom>
+          <a:noFill/>
+        </p:spPr>
+        <p:txBody>
+          <a:bodyPr wrap="square" rtlCol="0">
+            <a:spAutoFit/>
+          </a:bodyPr>
+          <a:lstStyle/>
+          <a:p>
+            <a:r>
+              <a:rPr lang="zh-CN" altLang="en-US" sz="2400" dirty="0"/>
+              <a:t>我们将整个实验过程分为三个阶段：</a:t>
+            </a:r>
+          </a:p>
+        </p:txBody>
+      </p:sp>
+      <p:grpSp>
+        <p:nvGrpSpPr>
+          <p:cNvPr id="27" name="组合 26">
+            <a:extLst>
+              <a:ext uri="{FF2B5EF4-FFF2-40B4-BE49-F238E27FC236}">
+                <a16:creationId xmlns:a16="http://schemas.microsoft.com/office/drawing/2014/main" id="{3114CA7C-63CD-B1BE-A92A-1BDC72776FF6}"/>
+              </a:ext>
+            </a:extLst>
+          </p:cNvPr>
+          <p:cNvGrpSpPr/>
+          <p:nvPr/>
+        </p:nvGrpSpPr>
+        <p:grpSpPr>
+          <a:xfrm>
+            <a:off x="1359132" y="1717407"/>
+            <a:ext cx="8838735" cy="3440649"/>
+            <a:chOff x="1359132" y="1946007"/>
+            <a:chExt cx="8838735" cy="3440649"/>
+          </a:xfrm>
+        </p:grpSpPr>
+        <p:sp>
+          <p:nvSpPr>
+            <p:cNvPr id="19" name="任意多边形: 形状 18">
+              <a:extLst>
+                <a:ext uri="{FF2B5EF4-FFF2-40B4-BE49-F238E27FC236}">
+                  <a16:creationId xmlns:a16="http://schemas.microsoft.com/office/drawing/2014/main" id="{7601A744-B352-EE25-0D13-42DEEAE39D7F}"/>
+                </a:ext>
+              </a:extLst>
+            </p:cNvPr>
+            <p:cNvSpPr/>
+            <p:nvPr/>
+          </p:nvSpPr>
+          <p:spPr>
+            <a:xfrm>
+              <a:off x="1359132" y="1946007"/>
+              <a:ext cx="8838735" cy="1287256"/>
+            </a:xfrm>
+            <a:custGeom>
+              <a:avLst/>
+              <a:gdLst>
+                <a:gd name="connsiteX0" fmla="*/ 0 w 8838735"/>
+                <a:gd name="connsiteY0" fmla="*/ 321814 h 1287256"/>
+                <a:gd name="connsiteX1" fmla="*/ 8195107 w 8838735"/>
+                <a:gd name="connsiteY1" fmla="*/ 321814 h 1287256"/>
+                <a:gd name="connsiteX2" fmla="*/ 8195107 w 8838735"/>
+                <a:gd name="connsiteY2" fmla="*/ 0 h 1287256"/>
+                <a:gd name="connsiteX3" fmla="*/ 8838735 w 8838735"/>
+                <a:gd name="connsiteY3" fmla="*/ 643628 h 1287256"/>
+                <a:gd name="connsiteX4" fmla="*/ 8195107 w 8838735"/>
+                <a:gd name="connsiteY4" fmla="*/ 1287256 h 1287256"/>
+                <a:gd name="connsiteX5" fmla="*/ 8195107 w 8838735"/>
+                <a:gd name="connsiteY5" fmla="*/ 965442 h 1287256"/>
+                <a:gd name="connsiteX6" fmla="*/ 0 w 8838735"/>
+                <a:gd name="connsiteY6" fmla="*/ 965442 h 1287256"/>
+                <a:gd name="connsiteX7" fmla="*/ 0 w 8838735"/>
+                <a:gd name="connsiteY7" fmla="*/ 321814 h 1287256"/>
+              </a:gdLst>
+              <a:ahLst/>
+              <a:cxnLst>
+                <a:cxn ang="0">
+                  <a:pos x="connsiteX0" y="connsiteY0"/>
+                </a:cxn>
+                <a:cxn ang="0">
+                  <a:pos x="connsiteX1" y="connsiteY1"/>
+                </a:cxn>
+                <a:cxn ang="0">
+                  <a:pos x="connsiteX2" y="connsiteY2"/>
+                </a:cxn>
+                <a:cxn ang="0">
+                  <a:pos x="connsiteX3" y="connsiteY3"/>
+                </a:cxn>
+                <a:cxn ang="0">
+                  <a:pos x="connsiteX4" y="connsiteY4"/>
+                </a:cxn>
+                <a:cxn ang="0">
+                  <a:pos x="connsiteX5" y="connsiteY5"/>
+                </a:cxn>
+                <a:cxn ang="0">
+                  <a:pos x="connsiteX6" y="connsiteY6"/>
+                </a:cxn>
+                <a:cxn ang="0">
+                  <a:pos x="connsiteX7" y="connsiteY7"/>
+                </a:cxn>
+              </a:cxnLst>
+              <a:rect l="l" t="t" r="r" b="b"/>
+              <a:pathLst>
+                <a:path w="8838735" h="1287256">
+                  <a:moveTo>
+                    <a:pt x="0" y="321814"/>
+                  </a:moveTo>
+                  <a:lnTo>
+                    <a:pt x="8195107" y="321814"/>
+                  </a:lnTo>
+                  <a:lnTo>
+                    <a:pt x="8195107" y="0"/>
+                  </a:lnTo>
+                  <a:lnTo>
+                    <a:pt x="8838735" y="643628"/>
+                  </a:lnTo>
+                  <a:lnTo>
+                    <a:pt x="8195107" y="1287256"/>
+                  </a:lnTo>
+                  <a:lnTo>
+                    <a:pt x="8195107" y="965442"/>
+                  </a:lnTo>
+                  <a:lnTo>
+                    <a:pt x="0" y="965442"/>
+                  </a:lnTo>
+                  <a:lnTo>
+                    <a:pt x="0" y="321814"/>
+                  </a:lnTo>
+                  <a:close/>
+                </a:path>
+              </a:pathLst>
+            </a:custGeom>
+            <a:solidFill>
+              <a:srgbClr val="EBDBA7"/>
+            </a:solidFill>
+          </p:spPr>
+          <p:style>
+            <a:lnRef idx="2">
+              <a:schemeClr val="lt1">
+                <a:hueOff val="0"/>
+                <a:satOff val="0"/>
+                <a:lumOff val="0"/>
+                <a:alphaOff val="0"/>
+              </a:schemeClr>
+            </a:lnRef>
+            <a:fillRef idx="1">
+              <a:scrgbClr r="0" g="0" b="0"/>
+            </a:fillRef>
+            <a:effectRef idx="0">
+              <a:schemeClr val="accent1">
+                <a:hueOff val="0"/>
+                <a:satOff val="0"/>
+                <a:lumOff val="0"/>
+                <a:alphaOff val="0"/>
+              </a:schemeClr>
+            </a:effectRef>
+            <a:fontRef idx="minor">
+              <a:schemeClr val="lt1"/>
+            </a:fontRef>
+          </p:style>
+          <p:txBody>
+            <a:bodyPr spcFirstLastPara="0" vert="horz" wrap="square" lIns="91440" tIns="413254" rIns="575814" bIns="526166" numCol="1" spcCol="1270" anchor="ctr" anchorCtr="0">
+              <a:noAutofit/>
+            </a:bodyPr>
+            <a:lstStyle/>
+            <a:p>
+              <a:pPr marL="0" lvl="0" indent="0" algn="l" defTabSz="1066800">
+                <a:lnSpc>
+                  <a:spcPct val="90000"/>
+                </a:lnSpc>
+                <a:spcBef>
+                  <a:spcPct val="0"/>
+                </a:spcBef>
+                <a:spcAft>
+                  <a:spcPct val="35000"/>
+                </a:spcAft>
+                <a:buNone/>
+              </a:pPr>
+              <a:r>
+                <a:rPr lang="en-US" altLang="zh-CN" sz="2400" kern="1200" dirty="0">
+                  <a:solidFill>
+                    <a:schemeClr val="tx1"/>
+                  </a:solidFill>
+                </a:rPr>
+                <a:t>Stage 1</a:t>
+              </a:r>
+              <a:endParaRPr lang="zh-CN" altLang="en-US" sz="2400" kern="1200" dirty="0">
+                <a:solidFill>
+                  <a:schemeClr val="tx1"/>
+                </a:solidFill>
+              </a:endParaRPr>
+            </a:p>
+          </p:txBody>
+        </p:sp>
+        <p:sp>
+          <p:nvSpPr>
+            <p:cNvPr id="20" name="任意多边形: 形状 19">
+              <a:extLst>
+                <a:ext uri="{FF2B5EF4-FFF2-40B4-BE49-F238E27FC236}">
+                  <a16:creationId xmlns:a16="http://schemas.microsoft.com/office/drawing/2014/main" id="{004F7DDA-720D-F6FB-AC54-A61F21E40482}"/>
+                </a:ext>
+              </a:extLst>
+            </p:cNvPr>
+            <p:cNvSpPr/>
+            <p:nvPr/>
+          </p:nvSpPr>
+          <p:spPr>
+            <a:xfrm>
+              <a:off x="1371832" y="2906926"/>
+              <a:ext cx="2722330" cy="2479730"/>
+            </a:xfrm>
+            <a:custGeom>
+              <a:avLst/>
+              <a:gdLst>
+                <a:gd name="connsiteX0" fmla="*/ 0 w 2722330"/>
+                <a:gd name="connsiteY0" fmla="*/ 0 h 2479730"/>
+                <a:gd name="connsiteX1" fmla="*/ 2722330 w 2722330"/>
+                <a:gd name="connsiteY1" fmla="*/ 0 h 2479730"/>
+                <a:gd name="connsiteX2" fmla="*/ 2722330 w 2722330"/>
+                <a:gd name="connsiteY2" fmla="*/ 2479730 h 2479730"/>
+                <a:gd name="connsiteX3" fmla="*/ 0 w 2722330"/>
+                <a:gd name="connsiteY3" fmla="*/ 2479730 h 2479730"/>
+                <a:gd name="connsiteX4" fmla="*/ 0 w 2722330"/>
+                <a:gd name="connsiteY4" fmla="*/ 0 h 2479730"/>
+              </a:gdLst>
+              <a:ahLst/>
+              <a:cxnLst>
+                <a:cxn ang="0">
+                  <a:pos x="connsiteX0" y="connsiteY0"/>
+                </a:cxn>
+                <a:cxn ang="0">
+                  <a:pos x="connsiteX1" y="connsiteY1"/>
+                </a:cxn>
+                <a:cxn ang="0">
+                  <a:pos x="connsiteX2" y="connsiteY2"/>
+                </a:cxn>
+                <a:cxn ang="0">
+                  <a:pos x="connsiteX3" y="connsiteY3"/>
+                </a:cxn>
+                <a:cxn ang="0">
+                  <a:pos x="connsiteX4" y="connsiteY4"/>
+                </a:cxn>
+              </a:cxnLst>
+              <a:rect l="l" t="t" r="r" b="b"/>
+              <a:pathLst>
+                <a:path w="2722330" h="2479730">
+                  <a:moveTo>
+                    <a:pt x="0" y="0"/>
+                  </a:moveTo>
+                  <a:lnTo>
+                    <a:pt x="2722330" y="0"/>
+                  </a:lnTo>
+                  <a:lnTo>
+                    <a:pt x="2722330" y="2479730"/>
+                  </a:lnTo>
+                  <a:lnTo>
+                    <a:pt x="0" y="2479730"/>
+                  </a:lnTo>
+                  <a:lnTo>
+                    <a:pt x="0" y="0"/>
+                  </a:lnTo>
+                  <a:close/>
+                </a:path>
+              </a:pathLst>
+            </a:custGeom>
+            <a:ln>
+              <a:solidFill>
+                <a:schemeClr val="tx1">
+                  <a:lumMod val="95000"/>
+                  <a:lumOff val="5000"/>
+                </a:schemeClr>
+              </a:solidFill>
+            </a:ln>
+          </p:spPr>
+          <p:style>
+            <a:lnRef idx="2">
+              <a:scrgbClr r="0" g="0" b="0"/>
+            </a:lnRef>
+            <a:fillRef idx="1">
+              <a:schemeClr val="lt1">
+                <a:hueOff val="0"/>
+                <a:satOff val="0"/>
+                <a:lumOff val="0"/>
+                <a:alphaOff val="0"/>
+              </a:schemeClr>
+            </a:fillRef>
+            <a:effectRef idx="0">
+              <a:schemeClr val="lt1">
+                <a:hueOff val="0"/>
+                <a:satOff val="0"/>
+                <a:lumOff val="0"/>
+                <a:alphaOff val="0"/>
+              </a:schemeClr>
+            </a:effectRef>
+            <a:fontRef idx="minor">
+              <a:schemeClr val="dk1">
+                <a:hueOff val="0"/>
+                <a:satOff val="0"/>
+                <a:lumOff val="0"/>
+                <a:alphaOff val="0"/>
+              </a:schemeClr>
+            </a:fontRef>
+          </p:style>
+          <p:txBody>
+            <a:bodyPr spcFirstLastPara="0" vert="horz" wrap="square" lIns="91440" tIns="91440" rIns="91440" bIns="91440" numCol="1" spcCol="1270" anchor="t" anchorCtr="0">
+              <a:noAutofit/>
+            </a:bodyPr>
+            <a:lstStyle/>
+            <a:p>
+              <a:pPr marL="0" lvl="0" indent="0" algn="l" defTabSz="1066800">
+                <a:lnSpc>
+                  <a:spcPct val="90000"/>
+                </a:lnSpc>
+                <a:spcBef>
+                  <a:spcPct val="0"/>
+                </a:spcBef>
+                <a:spcAft>
+                  <a:spcPct val="35000"/>
+                </a:spcAft>
+                <a:buNone/>
+              </a:pPr>
+              <a:r>
+                <a:rPr lang="zh-CN" altLang="en-US" sz="2400" kern="1200" dirty="0"/>
+                <a:t>项目开始</a:t>
+              </a:r>
+              <a:r>
+                <a:rPr lang="en-US" altLang="zh-CN" sz="2400" kern="1200" dirty="0"/>
+                <a:t>~</a:t>
+              </a:r>
+            </a:p>
+            <a:p>
+              <a:pPr marL="0" lvl="0" indent="0" algn="l" defTabSz="1066800">
+                <a:lnSpc>
+                  <a:spcPct val="90000"/>
+                </a:lnSpc>
+                <a:spcBef>
+                  <a:spcPct val="0"/>
+                </a:spcBef>
+                <a:spcAft>
+                  <a:spcPct val="35000"/>
+                </a:spcAft>
+                <a:buNone/>
+              </a:pPr>
+              <a:r>
+                <a:rPr lang="zh-CN" altLang="en-US" sz="2400" kern="1200" dirty="0"/>
+                <a:t>完成开题报告</a:t>
+              </a:r>
+            </a:p>
+          </p:txBody>
+        </p:sp>
+      </p:grpSp>
+      <p:grpSp>
+        <p:nvGrpSpPr>
+          <p:cNvPr id="28" name="组合 27">
+            <a:extLst>
+              <a:ext uri="{FF2B5EF4-FFF2-40B4-BE49-F238E27FC236}">
+                <a16:creationId xmlns:a16="http://schemas.microsoft.com/office/drawing/2014/main" id="{B70F5CAD-9EB0-0D4C-6BFB-336CE7775257}"/>
+              </a:ext>
+            </a:extLst>
+          </p:cNvPr>
+          <p:cNvGrpSpPr/>
+          <p:nvPr/>
+        </p:nvGrpSpPr>
+        <p:grpSpPr>
+          <a:xfrm>
+            <a:off x="4075112" y="2146493"/>
+            <a:ext cx="6116404" cy="3446998"/>
+            <a:chOff x="4075112" y="2375093"/>
+            <a:chExt cx="6116404" cy="3446998"/>
+          </a:xfrm>
+        </p:grpSpPr>
+        <p:sp>
+          <p:nvSpPr>
+            <p:cNvPr id="21" name="任意多边形: 形状 20">
+              <a:extLst>
+                <a:ext uri="{FF2B5EF4-FFF2-40B4-BE49-F238E27FC236}">
+                  <a16:creationId xmlns:a16="http://schemas.microsoft.com/office/drawing/2014/main" id="{CDD09BF2-2234-8439-791A-EFC1679FB859}"/>
+                </a:ext>
+              </a:extLst>
+            </p:cNvPr>
+            <p:cNvSpPr/>
+            <p:nvPr/>
+          </p:nvSpPr>
+          <p:spPr>
+            <a:xfrm>
+              <a:off x="4075112" y="2375093"/>
+              <a:ext cx="6116404" cy="1287256"/>
+            </a:xfrm>
+            <a:custGeom>
+              <a:avLst/>
+              <a:gdLst>
+                <a:gd name="connsiteX0" fmla="*/ 0 w 6116404"/>
+                <a:gd name="connsiteY0" fmla="*/ 321814 h 1287256"/>
+                <a:gd name="connsiteX1" fmla="*/ 5472776 w 6116404"/>
+                <a:gd name="connsiteY1" fmla="*/ 321814 h 1287256"/>
+                <a:gd name="connsiteX2" fmla="*/ 5472776 w 6116404"/>
+                <a:gd name="connsiteY2" fmla="*/ 0 h 1287256"/>
+                <a:gd name="connsiteX3" fmla="*/ 6116404 w 6116404"/>
+                <a:gd name="connsiteY3" fmla="*/ 643628 h 1287256"/>
+                <a:gd name="connsiteX4" fmla="*/ 5472776 w 6116404"/>
+                <a:gd name="connsiteY4" fmla="*/ 1287256 h 1287256"/>
+                <a:gd name="connsiteX5" fmla="*/ 5472776 w 6116404"/>
+                <a:gd name="connsiteY5" fmla="*/ 965442 h 1287256"/>
+                <a:gd name="connsiteX6" fmla="*/ 0 w 6116404"/>
+                <a:gd name="connsiteY6" fmla="*/ 965442 h 1287256"/>
+                <a:gd name="connsiteX7" fmla="*/ 0 w 6116404"/>
+                <a:gd name="connsiteY7" fmla="*/ 321814 h 1287256"/>
+              </a:gdLst>
+              <a:ahLst/>
+              <a:cxnLst>
+                <a:cxn ang="0">
+                  <a:pos x="connsiteX0" y="connsiteY0"/>
+                </a:cxn>
+                <a:cxn ang="0">
+                  <a:pos x="connsiteX1" y="connsiteY1"/>
+                </a:cxn>
+                <a:cxn ang="0">
+                  <a:pos x="connsiteX2" y="connsiteY2"/>
+                </a:cxn>
+                <a:cxn ang="0">
+                  <a:pos x="connsiteX3" y="connsiteY3"/>
+                </a:cxn>
+                <a:cxn ang="0">
+                  <a:pos x="connsiteX4" y="connsiteY4"/>
+                </a:cxn>
+                <a:cxn ang="0">
+                  <a:pos x="connsiteX5" y="connsiteY5"/>
+                </a:cxn>
+                <a:cxn ang="0">
+                  <a:pos x="connsiteX6" y="connsiteY6"/>
+                </a:cxn>
+                <a:cxn ang="0">
+                  <a:pos x="connsiteX7" y="connsiteY7"/>
+                </a:cxn>
+              </a:cxnLst>
+              <a:rect l="l" t="t" r="r" b="b"/>
+              <a:pathLst>
+                <a:path w="6116404" h="1287256">
+                  <a:moveTo>
+                    <a:pt x="0" y="321814"/>
+                  </a:moveTo>
+                  <a:lnTo>
+                    <a:pt x="5472776" y="321814"/>
+                  </a:lnTo>
+                  <a:lnTo>
+                    <a:pt x="5472776" y="0"/>
+                  </a:lnTo>
+                  <a:lnTo>
+                    <a:pt x="6116404" y="643628"/>
+                  </a:lnTo>
+                  <a:lnTo>
+                    <a:pt x="5472776" y="1287256"/>
+                  </a:lnTo>
+                  <a:lnTo>
+                    <a:pt x="5472776" y="965442"/>
+                  </a:lnTo>
+                  <a:lnTo>
+                    <a:pt x="0" y="965442"/>
+                  </a:lnTo>
+                  <a:lnTo>
+                    <a:pt x="0" y="321814"/>
+                  </a:lnTo>
+                  <a:close/>
+                </a:path>
+              </a:pathLst>
+            </a:custGeom>
+            <a:solidFill>
+              <a:srgbClr val="D4CBAC"/>
+            </a:solidFill>
+          </p:spPr>
+          <p:style>
+            <a:lnRef idx="2">
+              <a:schemeClr val="lt1">
+                <a:hueOff val="0"/>
+                <a:satOff val="0"/>
+                <a:lumOff val="0"/>
+                <a:alphaOff val="0"/>
+              </a:schemeClr>
+            </a:lnRef>
+            <a:fillRef idx="1">
+              <a:scrgbClr r="0" g="0" b="0"/>
+            </a:fillRef>
+            <a:effectRef idx="0">
+              <a:schemeClr val="accent1">
+                <a:hueOff val="0"/>
+                <a:satOff val="0"/>
+                <a:lumOff val="0"/>
+                <a:alphaOff val="0"/>
+              </a:schemeClr>
+            </a:effectRef>
+            <a:fontRef idx="minor">
+              <a:schemeClr val="lt1"/>
+            </a:fontRef>
+          </p:style>
+          <p:txBody>
+            <a:bodyPr spcFirstLastPara="0" vert="horz" wrap="square" lIns="91440" tIns="413254" rIns="575814" bIns="526166" numCol="1" spcCol="1270" anchor="ctr" anchorCtr="0">
+              <a:noAutofit/>
+            </a:bodyPr>
+            <a:lstStyle/>
+            <a:p>
+              <a:pPr marL="0" lvl="0" indent="0" algn="l" defTabSz="1066800">
+                <a:lnSpc>
+                  <a:spcPct val="90000"/>
+                </a:lnSpc>
+                <a:spcBef>
+                  <a:spcPct val="0"/>
+                </a:spcBef>
+                <a:spcAft>
+                  <a:spcPct val="35000"/>
+                </a:spcAft>
+                <a:buNone/>
+              </a:pPr>
+              <a:r>
+                <a:rPr lang="en-US" altLang="zh-CN" sz="2400" kern="1200" dirty="0">
+                  <a:solidFill>
+                    <a:schemeClr val="tx1"/>
+                  </a:solidFill>
+                </a:rPr>
+                <a:t>Stage 2</a:t>
+              </a:r>
+              <a:endParaRPr lang="zh-CN" altLang="en-US" sz="2400" kern="1200" dirty="0">
+                <a:solidFill>
+                  <a:schemeClr val="tx1"/>
+                </a:solidFill>
+              </a:endParaRPr>
+            </a:p>
+          </p:txBody>
+        </p:sp>
+        <p:sp>
+          <p:nvSpPr>
+            <p:cNvPr id="22" name="任意多边形: 形状 21">
+              <a:extLst>
+                <a:ext uri="{FF2B5EF4-FFF2-40B4-BE49-F238E27FC236}">
+                  <a16:creationId xmlns:a16="http://schemas.microsoft.com/office/drawing/2014/main" id="{6A9C524C-B11E-5F9B-17F2-E4E08E5EE41D}"/>
+                </a:ext>
+              </a:extLst>
+            </p:cNvPr>
+            <p:cNvSpPr/>
+            <p:nvPr/>
+          </p:nvSpPr>
+          <p:spPr>
+            <a:xfrm>
+              <a:off x="4087812" y="3342361"/>
+              <a:ext cx="2722330" cy="2479730"/>
+            </a:xfrm>
+            <a:custGeom>
+              <a:avLst/>
+              <a:gdLst>
+                <a:gd name="connsiteX0" fmla="*/ 0 w 2722330"/>
+                <a:gd name="connsiteY0" fmla="*/ 0 h 2479730"/>
+                <a:gd name="connsiteX1" fmla="*/ 2722330 w 2722330"/>
+                <a:gd name="connsiteY1" fmla="*/ 0 h 2479730"/>
+                <a:gd name="connsiteX2" fmla="*/ 2722330 w 2722330"/>
+                <a:gd name="connsiteY2" fmla="*/ 2479730 h 2479730"/>
+                <a:gd name="connsiteX3" fmla="*/ 0 w 2722330"/>
+                <a:gd name="connsiteY3" fmla="*/ 2479730 h 2479730"/>
+                <a:gd name="connsiteX4" fmla="*/ 0 w 2722330"/>
+                <a:gd name="connsiteY4" fmla="*/ 0 h 2479730"/>
+              </a:gdLst>
+              <a:ahLst/>
+              <a:cxnLst>
+                <a:cxn ang="0">
+                  <a:pos x="connsiteX0" y="connsiteY0"/>
+                </a:cxn>
+                <a:cxn ang="0">
+                  <a:pos x="connsiteX1" y="connsiteY1"/>
+                </a:cxn>
+                <a:cxn ang="0">
+                  <a:pos x="connsiteX2" y="connsiteY2"/>
+                </a:cxn>
+                <a:cxn ang="0">
+                  <a:pos x="connsiteX3" y="connsiteY3"/>
+                </a:cxn>
+                <a:cxn ang="0">
+                  <a:pos x="connsiteX4" y="connsiteY4"/>
+                </a:cxn>
+              </a:cxnLst>
+              <a:rect l="l" t="t" r="r" b="b"/>
+              <a:pathLst>
+                <a:path w="2722330" h="2479730">
+                  <a:moveTo>
+                    <a:pt x="0" y="0"/>
+                  </a:moveTo>
+                  <a:lnTo>
+                    <a:pt x="2722330" y="0"/>
+                  </a:lnTo>
+                  <a:lnTo>
+                    <a:pt x="2722330" y="2479730"/>
+                  </a:lnTo>
+                  <a:lnTo>
+                    <a:pt x="0" y="2479730"/>
+                  </a:lnTo>
+                  <a:lnTo>
+                    <a:pt x="0" y="0"/>
+                  </a:lnTo>
+                  <a:close/>
+                </a:path>
+              </a:pathLst>
+            </a:custGeom>
+            <a:ln>
+              <a:solidFill>
+                <a:schemeClr val="tx1"/>
+              </a:solidFill>
+            </a:ln>
+          </p:spPr>
+          <p:style>
+            <a:lnRef idx="2">
+              <a:scrgbClr r="0" g="0" b="0"/>
+            </a:lnRef>
+            <a:fillRef idx="1">
+              <a:schemeClr val="lt1">
+                <a:hueOff val="0"/>
+                <a:satOff val="0"/>
+                <a:lumOff val="0"/>
+                <a:alphaOff val="0"/>
+              </a:schemeClr>
+            </a:fillRef>
+            <a:effectRef idx="0">
+              <a:schemeClr val="lt1">
+                <a:hueOff val="0"/>
+                <a:satOff val="0"/>
+                <a:lumOff val="0"/>
+                <a:alphaOff val="0"/>
+              </a:schemeClr>
+            </a:effectRef>
+            <a:fontRef idx="minor">
+              <a:schemeClr val="dk1">
+                <a:hueOff val="0"/>
+                <a:satOff val="0"/>
+                <a:lumOff val="0"/>
+                <a:alphaOff val="0"/>
+              </a:schemeClr>
+            </a:fontRef>
+          </p:style>
+          <p:txBody>
+            <a:bodyPr spcFirstLastPara="0" vert="horz" wrap="square" lIns="91440" tIns="91440" rIns="91440" bIns="91440" numCol="1" spcCol="1270" anchor="t" anchorCtr="0">
+              <a:noAutofit/>
+            </a:bodyPr>
+            <a:lstStyle/>
+            <a:p>
+              <a:pPr marL="0" lvl="0" indent="0" algn="l" defTabSz="1066800">
+                <a:lnSpc>
+                  <a:spcPct val="90000"/>
+                </a:lnSpc>
+                <a:spcBef>
+                  <a:spcPct val="0"/>
+                </a:spcBef>
+                <a:spcAft>
+                  <a:spcPct val="35000"/>
+                </a:spcAft>
+                <a:buNone/>
+              </a:pPr>
+              <a:r>
+                <a:rPr lang="zh-CN" altLang="en-US" sz="2400" kern="1200" dirty="0"/>
+                <a:t>完成开题报告</a:t>
+              </a:r>
+              <a:r>
+                <a:rPr lang="en-US" altLang="zh-CN" sz="2400" kern="1200" dirty="0"/>
+                <a:t>~</a:t>
+              </a:r>
+            </a:p>
+            <a:p>
+              <a:pPr marL="0" lvl="0" indent="0" algn="l" defTabSz="1066800">
+                <a:lnSpc>
+                  <a:spcPct val="90000"/>
+                </a:lnSpc>
+                <a:spcBef>
+                  <a:spcPct val="0"/>
+                </a:spcBef>
+                <a:spcAft>
+                  <a:spcPct val="35000"/>
+                </a:spcAft>
+                <a:buNone/>
+              </a:pPr>
+              <a:r>
+                <a:rPr lang="zh-CN" altLang="en-US" sz="2400" kern="1200" dirty="0"/>
+                <a:t>初步完成</a:t>
+              </a:r>
+              <a:r>
+                <a:rPr lang="en-US" altLang="zh-CN" sz="2400" kern="1200" dirty="0"/>
+                <a:t>app</a:t>
+              </a:r>
+              <a:r>
+                <a:rPr lang="zh-CN" altLang="en-US" sz="2400" kern="1200" dirty="0"/>
+                <a:t>制作</a:t>
+              </a:r>
+            </a:p>
+          </p:txBody>
+        </p:sp>
+      </p:grpSp>
+      <p:grpSp>
+        <p:nvGrpSpPr>
+          <p:cNvPr id="29" name="组合 28">
+            <a:extLst>
+              <a:ext uri="{FF2B5EF4-FFF2-40B4-BE49-F238E27FC236}">
+                <a16:creationId xmlns:a16="http://schemas.microsoft.com/office/drawing/2014/main" id="{2950A75D-9B8E-22FF-9E40-97E981153090}"/>
+              </a:ext>
+            </a:extLst>
+          </p:cNvPr>
+          <p:cNvGrpSpPr/>
+          <p:nvPr/>
+        </p:nvGrpSpPr>
+        <p:grpSpPr>
+          <a:xfrm>
+            <a:off x="6797449" y="2684676"/>
+            <a:ext cx="3394074" cy="3199949"/>
+            <a:chOff x="6797449" y="2913276"/>
+            <a:chExt cx="3394074" cy="3199949"/>
+          </a:xfrm>
+        </p:grpSpPr>
+        <p:sp>
+          <p:nvSpPr>
+            <p:cNvPr id="23" name="任意多边形: 形状 22">
+              <a:extLst>
+                <a:ext uri="{FF2B5EF4-FFF2-40B4-BE49-F238E27FC236}">
+                  <a16:creationId xmlns:a16="http://schemas.microsoft.com/office/drawing/2014/main" id="{9634C0E7-8366-0AC3-399E-B7487CBFF22A}"/>
+                </a:ext>
+              </a:extLst>
+            </p:cNvPr>
+            <p:cNvSpPr/>
+            <p:nvPr/>
+          </p:nvSpPr>
+          <p:spPr>
+            <a:xfrm>
+              <a:off x="6797449" y="2913276"/>
+              <a:ext cx="3394074" cy="1017449"/>
+            </a:xfrm>
+            <a:custGeom>
+              <a:avLst/>
+              <a:gdLst>
+                <a:gd name="connsiteX0" fmla="*/ 0 w 3394074"/>
+                <a:gd name="connsiteY0" fmla="*/ 238284 h 953136"/>
+                <a:gd name="connsiteX1" fmla="*/ 2917506 w 3394074"/>
+                <a:gd name="connsiteY1" fmla="*/ 238284 h 953136"/>
+                <a:gd name="connsiteX2" fmla="*/ 2917506 w 3394074"/>
+                <a:gd name="connsiteY2" fmla="*/ 0 h 953136"/>
+                <a:gd name="connsiteX3" fmla="*/ 3394074 w 3394074"/>
+                <a:gd name="connsiteY3" fmla="*/ 476568 h 953136"/>
+                <a:gd name="connsiteX4" fmla="*/ 2917506 w 3394074"/>
+                <a:gd name="connsiteY4" fmla="*/ 953136 h 953136"/>
+                <a:gd name="connsiteX5" fmla="*/ 2917506 w 3394074"/>
+                <a:gd name="connsiteY5" fmla="*/ 714852 h 953136"/>
+                <a:gd name="connsiteX6" fmla="*/ 0 w 3394074"/>
+                <a:gd name="connsiteY6" fmla="*/ 714852 h 953136"/>
+                <a:gd name="connsiteX7" fmla="*/ 0 w 3394074"/>
+                <a:gd name="connsiteY7" fmla="*/ 238284 h 953136"/>
+              </a:gdLst>
+              <a:ahLst/>
+              <a:cxnLst>
+                <a:cxn ang="0">
+                  <a:pos x="connsiteX0" y="connsiteY0"/>
+                </a:cxn>
+                <a:cxn ang="0">
+                  <a:pos x="connsiteX1" y="connsiteY1"/>
+                </a:cxn>
+                <a:cxn ang="0">
+                  <a:pos x="connsiteX2" y="connsiteY2"/>
+                </a:cxn>
+                <a:cxn ang="0">
+                  <a:pos x="connsiteX3" y="connsiteY3"/>
+                </a:cxn>
+                <a:cxn ang="0">
+                  <a:pos x="connsiteX4" y="connsiteY4"/>
+                </a:cxn>
+                <a:cxn ang="0">
+                  <a:pos x="connsiteX5" y="connsiteY5"/>
+                </a:cxn>
+                <a:cxn ang="0">
+                  <a:pos x="connsiteX6" y="connsiteY6"/>
+                </a:cxn>
+                <a:cxn ang="0">
+                  <a:pos x="connsiteX7" y="connsiteY7"/>
+                </a:cxn>
+              </a:cxnLst>
+              <a:rect l="l" t="t" r="r" b="b"/>
+              <a:pathLst>
+                <a:path w="3394074" h="953136">
+                  <a:moveTo>
+                    <a:pt x="0" y="238284"/>
+                  </a:moveTo>
+                  <a:lnTo>
+                    <a:pt x="2917506" y="238284"/>
+                  </a:lnTo>
+                  <a:lnTo>
+                    <a:pt x="2917506" y="0"/>
+                  </a:lnTo>
+                  <a:lnTo>
+                    <a:pt x="3394074" y="476568"/>
+                  </a:lnTo>
+                  <a:lnTo>
+                    <a:pt x="2917506" y="953136"/>
+                  </a:lnTo>
+                  <a:lnTo>
+                    <a:pt x="2917506" y="714852"/>
+                  </a:lnTo>
+                  <a:lnTo>
+                    <a:pt x="0" y="714852"/>
+                  </a:lnTo>
+                  <a:lnTo>
+                    <a:pt x="0" y="238284"/>
+                  </a:lnTo>
+                  <a:close/>
+                </a:path>
+              </a:pathLst>
+            </a:custGeom>
+            <a:solidFill>
+              <a:srgbClr val="7C785D"/>
+            </a:solidFill>
+          </p:spPr>
+          <p:style>
+            <a:lnRef idx="2">
+              <a:schemeClr val="lt1">
+                <a:hueOff val="0"/>
+                <a:satOff val="0"/>
+                <a:lumOff val="0"/>
+                <a:alphaOff val="0"/>
+              </a:schemeClr>
+            </a:lnRef>
+            <a:fillRef idx="1">
+              <a:scrgbClr r="0" g="0" b="0"/>
+            </a:fillRef>
+            <a:effectRef idx="0">
+              <a:schemeClr val="accent1">
+                <a:hueOff val="0"/>
+                <a:satOff val="0"/>
+                <a:lumOff val="0"/>
+                <a:alphaOff val="0"/>
+              </a:schemeClr>
+            </a:effectRef>
+            <a:fontRef idx="minor">
+              <a:schemeClr val="lt1"/>
+            </a:fontRef>
+          </p:style>
+          <p:txBody>
+            <a:bodyPr spcFirstLastPara="0" vert="horz" wrap="square" lIns="91440" tIns="329724" rIns="492284" bIns="442636" numCol="1" spcCol="1270" anchor="ctr" anchorCtr="0">
+              <a:noAutofit/>
+            </a:bodyPr>
+            <a:lstStyle/>
+            <a:p>
+              <a:pPr marL="0" lvl="0" indent="0" algn="l" defTabSz="1066800">
+                <a:lnSpc>
+                  <a:spcPct val="90000"/>
+                </a:lnSpc>
+                <a:spcBef>
+                  <a:spcPct val="0"/>
+                </a:spcBef>
+                <a:spcAft>
+                  <a:spcPct val="35000"/>
+                </a:spcAft>
+                <a:buNone/>
+              </a:pPr>
+              <a:r>
+                <a:rPr lang="en-US" altLang="zh-CN" sz="2400" kern="1200" dirty="0">
+                  <a:solidFill>
+                    <a:schemeClr val="tx1"/>
+                  </a:solidFill>
+                </a:rPr>
+                <a:t>Stage 3</a:t>
+              </a:r>
+              <a:endParaRPr lang="zh-CN" altLang="en-US" sz="2400" kern="1200" dirty="0">
+                <a:solidFill>
+                  <a:schemeClr val="tx1"/>
+                </a:solidFill>
+              </a:endParaRPr>
+            </a:p>
+          </p:txBody>
+        </p:sp>
+        <p:sp>
+          <p:nvSpPr>
+            <p:cNvPr id="24" name="任意多边形: 形状 23">
+              <a:extLst>
+                <a:ext uri="{FF2B5EF4-FFF2-40B4-BE49-F238E27FC236}">
+                  <a16:creationId xmlns:a16="http://schemas.microsoft.com/office/drawing/2014/main" id="{07EFFEA7-74EF-1CC9-C110-3536499BEE1E}"/>
+                </a:ext>
+              </a:extLst>
+            </p:cNvPr>
+            <p:cNvSpPr/>
+            <p:nvPr/>
+          </p:nvSpPr>
+          <p:spPr>
+            <a:xfrm>
+              <a:off x="6804957" y="3669786"/>
+              <a:ext cx="2948692" cy="2443439"/>
+            </a:xfrm>
+            <a:custGeom>
+              <a:avLst/>
+              <a:gdLst>
+                <a:gd name="connsiteX0" fmla="*/ 0 w 2948692"/>
+                <a:gd name="connsiteY0" fmla="*/ 0 h 2443439"/>
+                <a:gd name="connsiteX1" fmla="*/ 2948692 w 2948692"/>
+                <a:gd name="connsiteY1" fmla="*/ 0 h 2443439"/>
+                <a:gd name="connsiteX2" fmla="*/ 2948692 w 2948692"/>
+                <a:gd name="connsiteY2" fmla="*/ 2443439 h 2443439"/>
+                <a:gd name="connsiteX3" fmla="*/ 0 w 2948692"/>
+                <a:gd name="connsiteY3" fmla="*/ 2443439 h 2443439"/>
+                <a:gd name="connsiteX4" fmla="*/ 0 w 2948692"/>
+                <a:gd name="connsiteY4" fmla="*/ 0 h 2443439"/>
+              </a:gdLst>
+              <a:ahLst/>
+              <a:cxnLst>
+                <a:cxn ang="0">
+                  <a:pos x="connsiteX0" y="connsiteY0"/>
+                </a:cxn>
+                <a:cxn ang="0">
+                  <a:pos x="connsiteX1" y="connsiteY1"/>
+                </a:cxn>
+                <a:cxn ang="0">
+                  <a:pos x="connsiteX2" y="connsiteY2"/>
+                </a:cxn>
+                <a:cxn ang="0">
+                  <a:pos x="connsiteX3" y="connsiteY3"/>
+                </a:cxn>
+                <a:cxn ang="0">
+                  <a:pos x="connsiteX4" y="connsiteY4"/>
+                </a:cxn>
+              </a:cxnLst>
+              <a:rect l="l" t="t" r="r" b="b"/>
+              <a:pathLst>
+                <a:path w="2948692" h="2443439">
+                  <a:moveTo>
+                    <a:pt x="0" y="0"/>
+                  </a:moveTo>
+                  <a:lnTo>
+                    <a:pt x="2948692" y="0"/>
+                  </a:lnTo>
+                  <a:lnTo>
+                    <a:pt x="2948692" y="2443439"/>
+                  </a:lnTo>
+                  <a:lnTo>
+                    <a:pt x="0" y="2443439"/>
+                  </a:lnTo>
+                  <a:lnTo>
+                    <a:pt x="0" y="0"/>
+                  </a:lnTo>
+                  <a:close/>
+                </a:path>
+              </a:pathLst>
+            </a:custGeom>
+            <a:ln>
+              <a:solidFill>
+                <a:schemeClr val="tx1"/>
+              </a:solidFill>
+            </a:ln>
+          </p:spPr>
+          <p:style>
+            <a:lnRef idx="2">
+              <a:scrgbClr r="0" g="0" b="0"/>
+            </a:lnRef>
+            <a:fillRef idx="1">
+              <a:schemeClr val="lt1">
+                <a:hueOff val="0"/>
+                <a:satOff val="0"/>
+                <a:lumOff val="0"/>
+                <a:alphaOff val="0"/>
+              </a:schemeClr>
+            </a:fillRef>
+            <a:effectRef idx="0">
+              <a:schemeClr val="lt1">
+                <a:hueOff val="0"/>
+                <a:satOff val="0"/>
+                <a:lumOff val="0"/>
+                <a:alphaOff val="0"/>
+              </a:schemeClr>
+            </a:effectRef>
+            <a:fontRef idx="minor">
+              <a:schemeClr val="dk1">
+                <a:hueOff val="0"/>
+                <a:satOff val="0"/>
+                <a:lumOff val="0"/>
+                <a:alphaOff val="0"/>
+              </a:schemeClr>
+            </a:fontRef>
+          </p:style>
+          <p:txBody>
+            <a:bodyPr spcFirstLastPara="0" vert="horz" wrap="square" lIns="91440" tIns="91440" rIns="91440" bIns="91440" numCol="1" spcCol="1270" anchor="t" anchorCtr="0">
+              <a:noAutofit/>
+            </a:bodyPr>
+            <a:lstStyle/>
+            <a:p>
+              <a:pPr marL="0" lvl="0" indent="0" algn="l" defTabSz="1066800">
+                <a:lnSpc>
+                  <a:spcPct val="90000"/>
+                </a:lnSpc>
+                <a:spcBef>
+                  <a:spcPct val="0"/>
+                </a:spcBef>
+                <a:spcAft>
+                  <a:spcPct val="35000"/>
+                </a:spcAft>
+                <a:buNone/>
+              </a:pPr>
+              <a:r>
+                <a:rPr lang="en-US" altLang="zh-CN" sz="2400" kern="1200" dirty="0"/>
+                <a:t>App</a:t>
+              </a:r>
+              <a:r>
+                <a:rPr lang="zh-CN" altLang="en-US" sz="2400" kern="1200" dirty="0"/>
+                <a:t>最终完善</a:t>
+              </a:r>
+              <a:r>
+                <a:rPr lang="en-US" altLang="zh-CN" sz="2400" kern="1200" dirty="0"/>
+                <a:t>~</a:t>
+              </a:r>
+            </a:p>
+            <a:p>
+              <a:pPr marL="0" lvl="0" indent="0" algn="l" defTabSz="1066800">
+                <a:lnSpc>
+                  <a:spcPct val="90000"/>
+                </a:lnSpc>
+                <a:spcBef>
+                  <a:spcPct val="0"/>
+                </a:spcBef>
+                <a:spcAft>
+                  <a:spcPct val="35000"/>
+                </a:spcAft>
+                <a:buNone/>
+              </a:pPr>
+              <a:r>
+                <a:rPr lang="zh-CN" altLang="en-US" sz="2400" kern="1200" dirty="0"/>
+                <a:t>完成实验报告</a:t>
+              </a:r>
+            </a:p>
+          </p:txBody>
+        </p:sp>
+      </p:grpSp>
+    </p:spTree>
+    <p:extLst>
+      <p:ext uri="{BB962C8B-B14F-4D97-AF65-F5344CB8AC3E}">
+        <p14:creationId xmlns:p14="http://schemas.microsoft.com/office/powerpoint/2010/main" val="4228431559"/>
+      </p:ext>
+    </p:extLst>
+  </p:cSld>
+  <p:clrMapOvr>
+    <a:masterClrMapping/>
+  </p:clrMapOvr>
+  <mc:AlternateContent xmlns:mc="http://schemas.openxmlformats.org/markup-compatibility/2006">
+    <mc:Choice xmlns:p159="http://schemas.microsoft.com/office/powerpoint/2015/09/main" Requires="p159">
+      <p:transition xmlns:p14="http://schemas.microsoft.com/office/powerpoint/2010/main" spd="slow" p14:dur="2000">
+        <p159:morph option="byObject"/>
+      </p:transition>
+    </mc:Choice>
+    <mc:Fallback>
+      <p:transition spd="slow">
+        <p:fade/>
+      </p:transition>
+    </mc:Fallback>
+  </mc:AlternateContent>
+  <p:timing>
+    <p:tnLst>
+      <p:par>
+        <p:cTn id="1" dur="indefinite" restart="never" nodeType="tmRoot">
+          <p:childTnLst>
+            <p:seq concurrent="1" nextAc="seek">
+              <p:cTn id="2" dur="indefinite" nodeType="mainSeq">
+                <p:childTnLst>
+                  <p:par>
+                    <p:cTn id="3" fill="hold">
+                      <p:stCondLst>
+                        <p:cond delay="indefinite"/>
+                      </p:stCondLst>
+                      <p:childTnLst>
+                        <p:par>
+                          <p:cTn id="4" fill="hold">
+                            <p:stCondLst>
+                              <p:cond delay="0"/>
+                            </p:stCondLst>
+                            <p:childTnLst>
+                              <p:par>
+                                <p:cTn id="5" presetID="1" presetClass="entr" presetSubtype="0" fill="hold" grpId="0" nodeType="clickEffect">
+                                  <p:stCondLst>
+                                    <p:cond delay="0"/>
+                                  </p:stCondLst>
+                                  <p:childTnLst>
+                                    <p:set>
+                                      <p:cBhvr>
+                                        <p:cTn id="6" dur="1" fill="hold">
+                                          <p:stCondLst>
+                                            <p:cond delay="0"/>
+                                          </p:stCondLst>
+                                        </p:cTn>
+                                        <p:tgtEl>
+                                          <p:spTgt spid="9"/>
+                                        </p:tgtEl>
+                                        <p:attrNameLst>
+                                          <p:attrName>style.visibility</p:attrName>
+                                        </p:attrNameLst>
+                                      </p:cBhvr>
+                                      <p:to>
+                                        <p:strVal val="visible"/>
+                                      </p:to>
+                                    </p:set>
+                                  </p:childTnLst>
+                                </p:cTn>
+                              </p:par>
+                            </p:childTnLst>
+                          </p:cTn>
+                        </p:par>
+                      </p:childTnLst>
+                    </p:cTn>
+                  </p:par>
+                  <p:par>
+                    <p:cTn id="7" fill="hold">
+                      <p:stCondLst>
+                        <p:cond delay="indefinite"/>
+                      </p:stCondLst>
+                      <p:childTnLst>
+                        <p:par>
+                          <p:cTn id="8" fill="hold">
+                            <p:stCondLst>
+                              <p:cond delay="0"/>
+                            </p:stCondLst>
+                            <p:childTnLst>
+                              <p:par>
+                                <p:cTn id="9" presetID="2" presetClass="entr" presetSubtype="8" fill="hold" nodeType="clickEffect">
+                                  <p:stCondLst>
+                                    <p:cond delay="0"/>
+                                  </p:stCondLst>
+                                  <p:childTnLst>
+                                    <p:set>
+                                      <p:cBhvr>
+                                        <p:cTn id="10" dur="1" fill="hold">
+                                          <p:stCondLst>
+                                            <p:cond delay="0"/>
+                                          </p:stCondLst>
+                                        </p:cTn>
+                                        <p:tgtEl>
+                                          <p:spTgt spid="27"/>
+                                        </p:tgtEl>
+                                        <p:attrNameLst>
+                                          <p:attrName>style.visibility</p:attrName>
+                                        </p:attrNameLst>
+                                      </p:cBhvr>
+                                      <p:to>
+                                        <p:strVal val="visible"/>
+                                      </p:to>
+                                    </p:set>
+                                    <p:anim calcmode="lin" valueType="num">
+                                      <p:cBhvr additive="base">
+                                        <p:cTn id="11" dur="500" fill="hold"/>
+                                        <p:tgtEl>
+                                          <p:spTgt spid="27"/>
+                                        </p:tgtEl>
+                                        <p:attrNameLst>
+                                          <p:attrName>ppt_x</p:attrName>
+                                        </p:attrNameLst>
+                                      </p:cBhvr>
+                                      <p:tavLst>
+                                        <p:tav tm="0">
+                                          <p:val>
+                                            <p:strVal val="0-#ppt_w/2"/>
+                                          </p:val>
+                                        </p:tav>
+                                        <p:tav tm="100000">
+                                          <p:val>
+                                            <p:strVal val="#ppt_x"/>
+                                          </p:val>
+                                        </p:tav>
+                                      </p:tavLst>
+                                    </p:anim>
+                                    <p:anim calcmode="lin" valueType="num">
+                                      <p:cBhvr additive="base">
+                                        <p:cTn id="12" dur="500" fill="hold"/>
+                                        <p:tgtEl>
+                                          <p:spTgt spid="27"/>
+                                        </p:tgtEl>
+                                        <p:attrNameLst>
+                                          <p:attrName>ppt_y</p:attrName>
+                                        </p:attrNameLst>
+                                      </p:cBhvr>
+                                      <p:tavLst>
+                                        <p:tav tm="0">
+                                          <p:val>
+                                            <p:strVal val="#ppt_y"/>
+                                          </p:val>
+                                        </p:tav>
+                                        <p:tav tm="100000">
+                                          <p:val>
+                                            <p:strVal val="#ppt_y"/>
+                                          </p:val>
+                                        </p:tav>
+                                      </p:tavLst>
+                                    </p:anim>
+                                  </p:childTnLst>
+                                </p:cTn>
+                              </p:par>
+                            </p:childTnLst>
+                          </p:cTn>
+                        </p:par>
+                        <p:par>
+                          <p:cTn id="13" fill="hold">
+                            <p:stCondLst>
+                              <p:cond delay="500"/>
+                            </p:stCondLst>
+                            <p:childTnLst>
+                              <p:par>
+                                <p:cTn id="14" presetID="2" presetClass="entr" presetSubtype="8" fill="hold" nodeType="afterEffect">
+                                  <p:stCondLst>
+                                    <p:cond delay="500"/>
+                                  </p:stCondLst>
+                                  <p:childTnLst>
+                                    <p:set>
+                                      <p:cBhvr>
+                                        <p:cTn id="15" dur="1" fill="hold">
+                                          <p:stCondLst>
+                                            <p:cond delay="0"/>
+                                          </p:stCondLst>
+                                        </p:cTn>
+                                        <p:tgtEl>
+                                          <p:spTgt spid="28"/>
+                                        </p:tgtEl>
+                                        <p:attrNameLst>
+                                          <p:attrName>style.visibility</p:attrName>
+                                        </p:attrNameLst>
+                                      </p:cBhvr>
+                                      <p:to>
+                                        <p:strVal val="visible"/>
+                                      </p:to>
+                                    </p:set>
+                                    <p:anim calcmode="lin" valueType="num">
+                                      <p:cBhvr additive="base">
+                                        <p:cTn id="16" dur="500" fill="hold"/>
+                                        <p:tgtEl>
+                                          <p:spTgt spid="28"/>
+                                        </p:tgtEl>
+                                        <p:attrNameLst>
+                                          <p:attrName>ppt_x</p:attrName>
+                                        </p:attrNameLst>
+                                      </p:cBhvr>
+                                      <p:tavLst>
+                                        <p:tav tm="0">
+                                          <p:val>
+                                            <p:strVal val="0-#ppt_w/2"/>
+                                          </p:val>
+                                        </p:tav>
+                                        <p:tav tm="100000">
+                                          <p:val>
+                                            <p:strVal val="#ppt_x"/>
+                                          </p:val>
+                                        </p:tav>
+                                      </p:tavLst>
+                                    </p:anim>
+                                    <p:anim calcmode="lin" valueType="num">
+                                      <p:cBhvr additive="base">
+                                        <p:cTn id="17" dur="500" fill="hold"/>
+                                        <p:tgtEl>
+                                          <p:spTgt spid="28"/>
+                                        </p:tgtEl>
+                                        <p:attrNameLst>
+                                          <p:attrName>ppt_y</p:attrName>
+                                        </p:attrNameLst>
+                                      </p:cBhvr>
+                                      <p:tavLst>
+                                        <p:tav tm="0">
+                                          <p:val>
+                                            <p:strVal val="#ppt_y"/>
+                                          </p:val>
+                                        </p:tav>
+                                        <p:tav tm="100000">
+                                          <p:val>
+                                            <p:strVal val="#ppt_y"/>
+                                          </p:val>
+                                        </p:tav>
+                                      </p:tavLst>
+                                    </p:anim>
+                                  </p:childTnLst>
+                                </p:cTn>
+                              </p:par>
+                            </p:childTnLst>
+                          </p:cTn>
+                        </p:par>
+                        <p:par>
+                          <p:cTn id="18" fill="hold">
+                            <p:stCondLst>
+                              <p:cond delay="1500"/>
+                            </p:stCondLst>
+                            <p:childTnLst>
+                              <p:par>
+                                <p:cTn id="19" presetID="2" presetClass="entr" presetSubtype="8" fill="hold" nodeType="afterEffect">
+                                  <p:stCondLst>
+                                    <p:cond delay="500"/>
+                                  </p:stCondLst>
+                                  <p:childTnLst>
+                                    <p:set>
+                                      <p:cBhvr>
+                                        <p:cTn id="20" dur="1" fill="hold">
+                                          <p:stCondLst>
+                                            <p:cond delay="0"/>
+                                          </p:stCondLst>
+                                        </p:cTn>
+                                        <p:tgtEl>
+                                          <p:spTgt spid="29"/>
+                                        </p:tgtEl>
+                                        <p:attrNameLst>
+                                          <p:attrName>style.visibility</p:attrName>
+                                        </p:attrNameLst>
+                                      </p:cBhvr>
+                                      <p:to>
+                                        <p:strVal val="visible"/>
+                                      </p:to>
+                                    </p:set>
+                                    <p:anim calcmode="lin" valueType="num">
+                                      <p:cBhvr additive="base">
+                                        <p:cTn id="21" dur="500" fill="hold"/>
+                                        <p:tgtEl>
+                                          <p:spTgt spid="29"/>
+                                        </p:tgtEl>
+                                        <p:attrNameLst>
+                                          <p:attrName>ppt_x</p:attrName>
+                                        </p:attrNameLst>
+                                      </p:cBhvr>
+                                      <p:tavLst>
+                                        <p:tav tm="0">
+                                          <p:val>
+                                            <p:strVal val="0-#ppt_w/2"/>
+                                          </p:val>
+                                        </p:tav>
+                                        <p:tav tm="100000">
+                                          <p:val>
+                                            <p:strVal val="#ppt_x"/>
+                                          </p:val>
+                                        </p:tav>
+                                      </p:tavLst>
+                                    </p:anim>
+                                    <p:anim calcmode="lin" valueType="num">
+                                      <p:cBhvr additive="base">
+                                        <p:cTn id="22" dur="500" fill="hold"/>
+                                        <p:tgtEl>
+                                          <p:spTgt spid="29"/>
+                                        </p:tgtEl>
+                                        <p:attrNameLst>
+                                          <p:attrName>ppt_y</p:attrName>
+                                        </p:attrNameLst>
+                                      </p:cBhvr>
+                                      <p:tavLst>
+                                        <p:tav tm="0">
+                                          <p:val>
+                                            <p:strVal val="#ppt_y"/>
+                                          </p:val>
+                                        </p:tav>
+                                        <p:tav tm="100000">
+                                          <p:val>
+                                            <p:strVal val="#ppt_y"/>
+                                          </p:val>
+                                        </p:tav>
+                                      </p:tavLst>
+                                    </p:anim>
+                                  </p:childTnLst>
+                                </p:cTn>
+                              </p:par>
+                            </p:childTnLst>
+                          </p:cTn>
+                        </p:par>
+                      </p:childTnLst>
+                    </p:cTn>
+                  </p:par>
+                </p:childTnLst>
+              </p:cTn>
+              <p:prevCondLst>
+                <p:cond evt="onPrev" delay="0">
+                  <p:tgtEl>
+                    <p:sldTgt/>
+                  </p:tgtEl>
+                </p:cond>
+              </p:prevCondLst>
+              <p:nextCondLst>
+                <p:cond evt="onNext" delay="0">
+                  <p:tgtEl>
+                    <p:sldTgt/>
+                  </p:tgtEl>
+                </p:cond>
+              </p:nextCondLst>
+            </p:seq>
+          </p:childTnLst>
+        </p:cTn>
+      </p:par>
+    </p:tnLst>
+    <p:bldLst>
+      <p:bldP spid="9" grpId="0"/>
+    </p:bldLst>
+  </p:timing>
+</p:sld>
+</file>
+
+<file path=ppt/slides/slide5.xml><?xml version="1.0" encoding="utf-8"?>
+<p:sld xmlns:a="http://schemas.openxmlformats.org/drawingml/2006/main" xmlns:r="http://schemas.openxmlformats.org/officeDocument/2006/relationships" xmlns:p="http://schemas.openxmlformats.org/presentationml/2006/main">
+  <p:cSld>
+    <p:spTree>
+      <p:nvGrpSpPr>
+        <p:cNvPr id="1" name="">
+          <a:extLst>
+            <a:ext uri="{FF2B5EF4-FFF2-40B4-BE49-F238E27FC236}">
+              <a16:creationId xmlns:a16="http://schemas.microsoft.com/office/drawing/2014/main" id="{6A70B42D-A251-7114-FF92-72D8E21D2791}"/>
+            </a:ext>
+          </a:extLst>
+        </p:cNvPr>
+        <p:cNvGrpSpPr/>
+        <p:nvPr/>
+      </p:nvGrpSpPr>
+      <p:grpSpPr>
+        <a:xfrm>
+          <a:off x="0" y="0"/>
+          <a:ext cx="0" cy="0"/>
+          <a:chOff x="0" y="0"/>
+          <a:chExt cx="0" cy="0"/>
+        </a:xfrm>
+      </p:grpSpPr>
+      <p:pic>
+        <p:nvPicPr>
+          <p:cNvPr id="6" name="图片 5">
+            <a:extLst>
+              <a:ext uri="{FF2B5EF4-FFF2-40B4-BE49-F238E27FC236}">
+                <a16:creationId xmlns:a16="http://schemas.microsoft.com/office/drawing/2014/main" id="{6C256364-A491-C9AB-896E-9480F37BDE53}"/>
+              </a:ext>
+            </a:extLst>
+          </p:cNvPr>
+          <p:cNvPicPr>
+            <a:picLocks noChangeAspect="1"/>
+          </p:cNvPicPr>
+          <p:nvPr/>
+        </p:nvPicPr>
+        <p:blipFill>
+          <a:blip r:embed="rId3">
+            <a:alphaModFix amt="85000"/>
+            <a:extLst>
+              <a:ext uri="{28A0092B-C50C-407E-A947-70E740481C1C}">
+                <a14:useLocalDpi xmlns:a14="http://schemas.microsoft.com/office/drawing/2010/main" val="0"/>
+              </a:ext>
+            </a:extLst>
+          </a:blip>
+          <a:srcRect l="4134" t="4134" r="4548" b="4548"/>
+          <a:stretch/>
+        </p:blipFill>
+        <p:spPr>
+          <a:xfrm>
+            <a:off x="63500" y="63500"/>
+            <a:ext cx="900000" cy="900000"/>
+          </a:xfrm>
+          <a:prstGeom prst="ellipse">
+            <a:avLst/>
+          </a:prstGeom>
+        </p:spPr>
+      </p:pic>
+      <p:sp>
+        <p:nvSpPr>
+          <p:cNvPr id="3" name="文本框 2">
+            <a:extLst>
+              <a:ext uri="{FF2B5EF4-FFF2-40B4-BE49-F238E27FC236}">
+                <a16:creationId xmlns:a16="http://schemas.microsoft.com/office/drawing/2014/main" id="{D6EC6A36-2626-2D2C-4E3B-377989E8455B}"/>
+              </a:ext>
+            </a:extLst>
+          </p:cNvPr>
+          <p:cNvSpPr txBox="1"/>
+          <p:nvPr/>
+        </p:nvSpPr>
+        <p:spPr>
+          <a:xfrm>
+            <a:off x="963500" y="221112"/>
+            <a:ext cx="2888984" cy="584775"/>
+          </a:xfrm>
+          <a:prstGeom prst="rect">
+            <a:avLst/>
+          </a:prstGeom>
+          <a:noFill/>
+        </p:spPr>
+        <p:txBody>
+          <a:bodyPr wrap="square" rtlCol="0">
+            <a:spAutoFit/>
+          </a:bodyPr>
+          <a:lstStyle/>
+          <a:p>
+            <a:r>
+              <a:rPr lang="zh-CN" altLang="en-US" sz="3200" b="1" dirty="0">
+                <a:latin typeface="+mn-ea"/>
+              </a:rPr>
+              <a:t>总体规划</a:t>
+            </a:r>
+          </a:p>
+        </p:txBody>
+      </p:sp>
+      <p:pic>
+        <p:nvPicPr>
+          <p:cNvPr id="8" name="图片 7">
+            <a:extLst>
+              <a:ext uri="{FF2B5EF4-FFF2-40B4-BE49-F238E27FC236}">
+                <a16:creationId xmlns:a16="http://schemas.microsoft.com/office/drawing/2014/main" id="{E6870700-62DB-DA45-E221-DEAAEE3984FD}"/>
+              </a:ext>
+            </a:extLst>
+          </p:cNvPr>
+          <p:cNvPicPr>
+            <a:picLocks noChangeAspect="1"/>
+          </p:cNvPicPr>
+          <p:nvPr/>
+        </p:nvPicPr>
+        <p:blipFill>
+          <a:blip r:embed="rId4">
+            <a:extLst>
+              <a:ext uri="{28A0092B-C50C-407E-A947-70E740481C1C}">
+                <a14:useLocalDpi xmlns:a14="http://schemas.microsoft.com/office/drawing/2010/main" val="0"/>
+              </a:ext>
+            </a:extLst>
+          </a:blip>
+          <a:srcRect r="2939" b="42037"/>
+          <a:stretch/>
+        </p:blipFill>
+        <p:spPr>
+          <a:xfrm>
+            <a:off x="343010" y="1946612"/>
+            <a:ext cx="5633654" cy="3470400"/>
+          </a:xfrm>
+          <a:prstGeom prst="rect">
+            <a:avLst/>
+          </a:prstGeom>
+        </p:spPr>
+      </p:pic>
+      <p:sp>
+        <p:nvSpPr>
+          <p:cNvPr id="10" name="文本框 9">
+            <a:extLst>
+              <a:ext uri="{FF2B5EF4-FFF2-40B4-BE49-F238E27FC236}">
+                <a16:creationId xmlns:a16="http://schemas.microsoft.com/office/drawing/2014/main" id="{2C70984E-2794-A824-8863-5B2364414FE5}"/>
+              </a:ext>
+            </a:extLst>
+          </p:cNvPr>
+          <p:cNvSpPr txBox="1"/>
+          <p:nvPr/>
+        </p:nvSpPr>
+        <p:spPr>
+          <a:xfrm>
+            <a:off x="250825" y="5509440"/>
+            <a:ext cx="5543550" cy="769441"/>
+          </a:xfrm>
+          <a:prstGeom prst="rect">
+            <a:avLst/>
+          </a:prstGeom>
+          <a:noFill/>
+        </p:spPr>
+        <p:txBody>
+          <a:bodyPr wrap="square" rtlCol="0">
+            <a:spAutoFit/>
+          </a:bodyPr>
+          <a:lstStyle/>
+          <a:p>
+            <a:pPr algn="ctr"/>
+            <a:r>
+              <a:rPr lang="en-US" altLang="zh-CN" sz="2400" b="1" dirty="0"/>
+              <a:t>GitHub</a:t>
+            </a:r>
+          </a:p>
+          <a:p>
+            <a:pPr algn="ctr"/>
+            <a:r>
+              <a:rPr lang="en-GB" altLang="zh-CN" sz="2000" dirty="0"/>
+              <a:t>https://github.com/hance0601/dsp_proj</a:t>
+            </a:r>
+            <a:endParaRPr lang="zh-CN" altLang="en-US" sz="2000" dirty="0"/>
+          </a:p>
+        </p:txBody>
+      </p:sp>
+      <p:sp>
+        <p:nvSpPr>
+          <p:cNvPr id="11" name="文本框 10">
+            <a:extLst>
+              <a:ext uri="{FF2B5EF4-FFF2-40B4-BE49-F238E27FC236}">
+                <a16:creationId xmlns:a16="http://schemas.microsoft.com/office/drawing/2014/main" id="{F96F3138-72AE-A322-3AF1-23CA2E95E8C6}"/>
+              </a:ext>
+            </a:extLst>
+          </p:cNvPr>
+          <p:cNvSpPr txBox="1"/>
+          <p:nvPr/>
+        </p:nvSpPr>
+        <p:spPr>
+          <a:xfrm>
+            <a:off x="6989194" y="5509440"/>
+            <a:ext cx="3981448" cy="769441"/>
+          </a:xfrm>
+          <a:prstGeom prst="rect">
+            <a:avLst/>
+          </a:prstGeom>
+          <a:noFill/>
+        </p:spPr>
+        <p:txBody>
+          <a:bodyPr wrap="square" rtlCol="0">
+            <a:spAutoFit/>
+          </a:bodyPr>
+          <a:lstStyle/>
+          <a:p>
+            <a:pPr algn="ctr"/>
+            <a:r>
+              <a:rPr lang="en-US" altLang="zh-CN" sz="2400" b="1" dirty="0" err="1"/>
+              <a:t>Gitee</a:t>
+            </a:r>
+            <a:endParaRPr lang="en-US" altLang="zh-CN" sz="2400" b="1" dirty="0"/>
+          </a:p>
+          <a:p>
+            <a:pPr algn="ctr"/>
+            <a:r>
+              <a:rPr lang="en-GB" altLang="zh-CN" sz="2000" dirty="0"/>
+              <a:t>https://gitee.com/alkylli/dsp_proj</a:t>
+            </a:r>
+            <a:endParaRPr lang="zh-CN" altLang="en-US" sz="2000" dirty="0"/>
+          </a:p>
+        </p:txBody>
+      </p:sp>
+      <p:sp>
+        <p:nvSpPr>
+          <p:cNvPr id="13" name="文本框 12">
+            <a:extLst>
+              <a:ext uri="{FF2B5EF4-FFF2-40B4-BE49-F238E27FC236}">
+                <a16:creationId xmlns:a16="http://schemas.microsoft.com/office/drawing/2014/main" id="{4EF6C2C3-FF56-B3B4-2C7E-551960F8A3EB}"/>
+              </a:ext>
+            </a:extLst>
+          </p:cNvPr>
+          <p:cNvSpPr txBox="1"/>
+          <p:nvPr/>
+        </p:nvSpPr>
+        <p:spPr>
+          <a:xfrm>
+            <a:off x="1098550" y="1117784"/>
+            <a:ext cx="3848100" cy="461665"/>
+          </a:xfrm>
+          <a:prstGeom prst="rect">
+            <a:avLst/>
+          </a:prstGeom>
+          <a:noFill/>
+        </p:spPr>
+        <p:txBody>
+          <a:bodyPr wrap="square" rtlCol="0">
+            <a:spAutoFit/>
+          </a:bodyPr>
+          <a:lstStyle/>
+          <a:p>
+            <a:r>
+              <a:rPr lang="zh-CN" altLang="en-US" sz="2400" dirty="0"/>
+              <a:t>项目开源</a:t>
+            </a:r>
+          </a:p>
+        </p:txBody>
+      </p:sp>
+      <p:pic>
+        <p:nvPicPr>
+          <p:cNvPr id="25" name="图片 24">
+            <a:extLst>
+              <a:ext uri="{FF2B5EF4-FFF2-40B4-BE49-F238E27FC236}">
+                <a16:creationId xmlns:a16="http://schemas.microsoft.com/office/drawing/2014/main" id="{07ACE9E4-E680-1773-5E13-D2EB2ADCD11C}"/>
+              </a:ext>
+            </a:extLst>
+          </p:cNvPr>
+          <p:cNvPicPr>
+            <a:picLocks noChangeAspect="1"/>
+          </p:cNvPicPr>
+          <p:nvPr/>
+        </p:nvPicPr>
+        <p:blipFill>
+          <a:blip r:embed="rId5">
+            <a:extLst>
+              <a:ext uri="{28A0092B-C50C-407E-A947-70E740481C1C}">
+                <a14:useLocalDpi xmlns:a14="http://schemas.microsoft.com/office/drawing/2010/main" val="0"/>
+              </a:ext>
+            </a:extLst>
+          </a:blip>
+          <a:srcRect r="15926" b="53611"/>
+          <a:stretch/>
+        </p:blipFill>
+        <p:spPr>
+          <a:xfrm>
+            <a:off x="6151274" y="1946612"/>
+            <a:ext cx="5657287" cy="3470400"/>
+          </a:xfrm>
+          <a:prstGeom prst="rect">
+            <a:avLst/>
+          </a:prstGeom>
+        </p:spPr>
+      </p:pic>
+    </p:spTree>
+    <p:extLst>
+      <p:ext uri="{BB962C8B-B14F-4D97-AF65-F5344CB8AC3E}">
+        <p14:creationId xmlns:p14="http://schemas.microsoft.com/office/powerpoint/2010/main" val="2748700836"/>
+      </p:ext>
+    </p:extLst>
+  </p:cSld>
+  <p:clrMapOvr>
+    <a:masterClrMapping/>
+  </p:clrMapOvr>
+  <mc:AlternateContent xmlns:mc="http://schemas.openxmlformats.org/markup-compatibility/2006">
+    <mc:Choice xmlns:p159="http://schemas.microsoft.com/office/powerpoint/2015/09/main" Requires="p159">
+      <p:transition xmlns:p14="http://schemas.microsoft.com/office/powerpoint/2010/main" spd="slow" p14:dur="2000">
+        <p159:morph option="byObject"/>
+      </p:transition>
+    </mc:Choice>
+    <mc:Fallback>
+      <p:transition spd="slow">
+        <p:fade/>
+      </p:transition>
+    </mc:Fallback>
+  </mc:AlternateContent>
+</p:sld>
+</file>
+
+<file path=ppt/slides/slide6.xml><?xml version="1.0" encoding="utf-8"?>
+<p:sld xmlns:a="http://schemas.openxmlformats.org/drawingml/2006/main" xmlns:r="http://schemas.openxmlformats.org/officeDocument/2006/relationships" xmlns:p="http://schemas.openxmlformats.org/presentationml/2006/main">
+  <p:cSld>
+    <p:spTree>
+      <p:nvGrpSpPr>
+        <p:cNvPr id="1" name="">
+          <a:extLst>
+            <a:ext uri="{FF2B5EF4-FFF2-40B4-BE49-F238E27FC236}">
+              <a16:creationId xmlns:a16="http://schemas.microsoft.com/office/drawing/2014/main" id="{AE2947A6-1ACF-2BB1-AC7F-5F3B79A4D325}"/>
+            </a:ext>
+          </a:extLst>
+        </p:cNvPr>
+        <p:cNvGrpSpPr/>
+        <p:nvPr/>
+      </p:nvGrpSpPr>
+      <p:grpSpPr>
+        <a:xfrm>
+          <a:off x="0" y="0"/>
+          <a:ext cx="0" cy="0"/>
+          <a:chOff x="0" y="0"/>
+          <a:chExt cx="0" cy="0"/>
+        </a:xfrm>
+      </p:grpSpPr>
+      <p:pic>
+        <p:nvPicPr>
+          <p:cNvPr id="6" name="图片 5">
+            <a:extLst>
+              <a:ext uri="{FF2B5EF4-FFF2-40B4-BE49-F238E27FC236}">
+                <a16:creationId xmlns:a16="http://schemas.microsoft.com/office/drawing/2014/main" id="{C88D289C-7D53-DBD6-5047-3C76D6D89E49}"/>
+              </a:ext>
+            </a:extLst>
+          </p:cNvPr>
+          <p:cNvPicPr>
+            <a:picLocks noChangeAspect="1"/>
+          </p:cNvPicPr>
+          <p:nvPr/>
+        </p:nvPicPr>
+        <p:blipFill>
+          <a:blip r:embed="rId2">
+            <a:alphaModFix amt="50000"/>
+            <a:extLst>
+              <a:ext uri="{28A0092B-C50C-407E-A947-70E740481C1C}">
+                <a14:useLocalDpi xmlns:a14="http://schemas.microsoft.com/office/drawing/2010/main" val="0"/>
+              </a:ext>
+            </a:extLst>
+          </a:blip>
+          <a:srcRect l="4134" t="4134" r="4548" b="4548"/>
+          <a:stretch/>
+        </p:blipFill>
+        <p:spPr>
+          <a:xfrm>
+            <a:off x="-3444876" y="3174"/>
+            <a:ext cx="6848981" cy="6848981"/>
+          </a:xfrm>
+          <a:prstGeom prst="ellipse">
+            <a:avLst/>
+          </a:prstGeom>
+        </p:spPr>
+      </p:pic>
+      <p:sp>
+        <p:nvSpPr>
+          <p:cNvPr id="2" name="文本框 1">
+            <a:extLst>
+              <a:ext uri="{FF2B5EF4-FFF2-40B4-BE49-F238E27FC236}">
+                <a16:creationId xmlns:a16="http://schemas.microsoft.com/office/drawing/2014/main" id="{1BF337A2-2766-B554-1E72-65C4A132F845}"/>
+              </a:ext>
+            </a:extLst>
+          </p:cNvPr>
+          <p:cNvSpPr txBox="1"/>
+          <p:nvPr/>
+        </p:nvSpPr>
+        <p:spPr>
+          <a:xfrm>
+            <a:off x="4172216" y="1430473"/>
+            <a:ext cx="1269734" cy="707886"/>
+          </a:xfrm>
+          <a:prstGeom prst="rect">
+            <a:avLst/>
+          </a:prstGeom>
+          <a:noFill/>
+        </p:spPr>
+        <p:txBody>
+          <a:bodyPr wrap="square" rtlCol="0">
+            <a:spAutoFit/>
+          </a:bodyPr>
+          <a:lstStyle/>
+          <a:p>
+            <a:pPr algn="ctr"/>
+            <a:r>
+              <a:rPr lang="zh-CN" altLang="en-US" sz="4000" b="1" dirty="0">
+                <a:latin typeface="+mn-ea"/>
+              </a:rPr>
+              <a:t>目录</a:t>
+            </a:r>
+          </a:p>
+        </p:txBody>
+      </p:sp>
+      <p:sp>
+        <p:nvSpPr>
+          <p:cNvPr id="3" name="文本框 2">
+            <a:extLst>
+              <a:ext uri="{FF2B5EF4-FFF2-40B4-BE49-F238E27FC236}">
+                <a16:creationId xmlns:a16="http://schemas.microsoft.com/office/drawing/2014/main" id="{38D63658-BF20-F640-D304-2EE42EC4668B}"/>
+              </a:ext>
+            </a:extLst>
+          </p:cNvPr>
+          <p:cNvSpPr txBox="1"/>
+          <p:nvPr/>
+        </p:nvSpPr>
+        <p:spPr>
+          <a:xfrm>
+            <a:off x="4210316" y="2192231"/>
+            <a:ext cx="2888984" cy="584775"/>
+          </a:xfrm>
+          <a:prstGeom prst="rect">
+            <a:avLst/>
+          </a:prstGeom>
+          <a:noFill/>
+        </p:spPr>
+        <p:txBody>
+          <a:bodyPr wrap="square" rtlCol="0">
+            <a:spAutoFit/>
+          </a:bodyPr>
+          <a:lstStyle/>
+          <a:p>
+            <a:r>
+              <a:rPr lang="zh-CN" altLang="en-US" sz="3200" dirty="0">
+                <a:latin typeface="+mn-ea"/>
+              </a:rPr>
+              <a:t>总体规划</a:t>
+            </a:r>
+          </a:p>
+        </p:txBody>
+      </p:sp>
+      <p:sp>
+        <p:nvSpPr>
+          <p:cNvPr id="4" name="文本框 3">
+            <a:extLst>
+              <a:ext uri="{FF2B5EF4-FFF2-40B4-BE49-F238E27FC236}">
+                <a16:creationId xmlns:a16="http://schemas.microsoft.com/office/drawing/2014/main" id="{DC68D1FF-2314-F1D9-785A-7B8E15E7CC91}"/>
+              </a:ext>
+            </a:extLst>
+          </p:cNvPr>
+          <p:cNvSpPr txBox="1"/>
+          <p:nvPr/>
+        </p:nvSpPr>
+        <p:spPr>
+          <a:xfrm>
+            <a:off x="4210316" y="2763475"/>
+            <a:ext cx="2888984" cy="584775"/>
+          </a:xfrm>
+          <a:prstGeom prst="rect">
+            <a:avLst/>
+          </a:prstGeom>
+          <a:noFill/>
+        </p:spPr>
+        <p:txBody>
+          <a:bodyPr wrap="square" rtlCol="0">
+            <a:spAutoFit/>
+          </a:bodyPr>
+          <a:lstStyle/>
+          <a:p>
+            <a:r>
+              <a:rPr lang="zh-CN" altLang="en-US" sz="3200" dirty="0">
+                <a:latin typeface="+mn-ea"/>
+              </a:rPr>
+              <a:t>项目分工</a:t>
+            </a:r>
+          </a:p>
+        </p:txBody>
+      </p:sp>
+      <p:sp>
+        <p:nvSpPr>
+          <p:cNvPr id="5" name="文本框 4">
+            <a:extLst>
+              <a:ext uri="{FF2B5EF4-FFF2-40B4-BE49-F238E27FC236}">
+                <a16:creationId xmlns:a16="http://schemas.microsoft.com/office/drawing/2014/main" id="{4121482F-4851-31D6-41F9-30A014EF3833}"/>
+              </a:ext>
+            </a:extLst>
+          </p:cNvPr>
+          <p:cNvSpPr txBox="1"/>
+          <p:nvPr/>
+        </p:nvSpPr>
+        <p:spPr>
+          <a:xfrm>
+            <a:off x="4210316" y="3334719"/>
+            <a:ext cx="2888984" cy="584775"/>
+          </a:xfrm>
+          <a:prstGeom prst="rect">
+            <a:avLst/>
+          </a:prstGeom>
+          <a:noFill/>
+        </p:spPr>
+        <p:txBody>
+          <a:bodyPr wrap="square" rtlCol="0">
+            <a:spAutoFit/>
+          </a:bodyPr>
+          <a:lstStyle/>
+          <a:p>
+            <a:r>
+              <a:rPr lang="zh-CN" altLang="en-US" sz="3200" dirty="0">
+                <a:latin typeface="+mn-ea"/>
+              </a:rPr>
+              <a:t>分项情况</a:t>
+            </a:r>
+          </a:p>
+        </p:txBody>
+      </p:sp>
+      <p:sp>
+        <p:nvSpPr>
+          <p:cNvPr id="7" name="文本框 6">
+            <a:extLst>
+              <a:ext uri="{FF2B5EF4-FFF2-40B4-BE49-F238E27FC236}">
+                <a16:creationId xmlns:a16="http://schemas.microsoft.com/office/drawing/2014/main" id="{AC53C157-FC80-F1DD-0002-9E4732A6FE51}"/>
+              </a:ext>
+            </a:extLst>
+          </p:cNvPr>
+          <p:cNvSpPr txBox="1"/>
+          <p:nvPr/>
+        </p:nvSpPr>
+        <p:spPr>
+          <a:xfrm>
+            <a:off x="4210316" y="3905963"/>
+            <a:ext cx="2888984" cy="584775"/>
+          </a:xfrm>
+          <a:prstGeom prst="rect">
+            <a:avLst/>
+          </a:prstGeom>
+          <a:noFill/>
+        </p:spPr>
+        <p:txBody>
+          <a:bodyPr wrap="square" rtlCol="0">
+            <a:spAutoFit/>
+          </a:bodyPr>
+          <a:lstStyle/>
+          <a:p>
+            <a:r>
+              <a:rPr lang="zh-CN" altLang="en-US" sz="3200" dirty="0">
+                <a:latin typeface="+mn-ea"/>
+              </a:rPr>
+              <a:t>后续计划</a:t>
+            </a:r>
+          </a:p>
+        </p:txBody>
+      </p:sp>
+      <p:sp>
+        <p:nvSpPr>
+          <p:cNvPr id="8" name="文本框 7">
+            <a:extLst>
+              <a:ext uri="{FF2B5EF4-FFF2-40B4-BE49-F238E27FC236}">
+                <a16:creationId xmlns:a16="http://schemas.microsoft.com/office/drawing/2014/main" id="{FCBBAA77-3991-28C4-2C13-425337B21F47}"/>
+              </a:ext>
+            </a:extLst>
+          </p:cNvPr>
+          <p:cNvSpPr txBox="1"/>
+          <p:nvPr/>
+        </p:nvSpPr>
+        <p:spPr>
+          <a:xfrm>
+            <a:off x="4210316" y="4477207"/>
+            <a:ext cx="2888984" cy="584775"/>
+          </a:xfrm>
+          <a:prstGeom prst="rect">
+            <a:avLst/>
+          </a:prstGeom>
+          <a:noFill/>
+        </p:spPr>
+        <p:txBody>
+          <a:bodyPr wrap="square" rtlCol="0">
+            <a:spAutoFit/>
+          </a:bodyPr>
+          <a:lstStyle/>
+          <a:p>
+            <a:r>
+              <a:rPr lang="zh-CN" altLang="en-US" sz="3200" dirty="0">
+                <a:latin typeface="+mn-ea"/>
+              </a:rPr>
+              <a:t>参考资料</a:t>
+            </a:r>
+          </a:p>
+        </p:txBody>
+      </p:sp>
+      <p:sp>
+        <p:nvSpPr>
+          <p:cNvPr id="10" name="文本框 9">
+            <a:extLst>
+              <a:ext uri="{FF2B5EF4-FFF2-40B4-BE49-F238E27FC236}">
+                <a16:creationId xmlns:a16="http://schemas.microsoft.com/office/drawing/2014/main" id="{857D295D-F141-5D4E-A6A9-7DA46AB3A951}"/>
+              </a:ext>
+            </a:extLst>
+          </p:cNvPr>
+          <p:cNvSpPr txBox="1"/>
+          <p:nvPr/>
+        </p:nvSpPr>
+        <p:spPr>
+          <a:xfrm>
+            <a:off x="4210316" y="5048450"/>
+            <a:ext cx="2888984" cy="584775"/>
+          </a:xfrm>
+          <a:prstGeom prst="rect">
+            <a:avLst/>
+          </a:prstGeom>
+          <a:noFill/>
+        </p:spPr>
+        <p:txBody>
+          <a:bodyPr wrap="square" rtlCol="0">
+            <a:spAutoFit/>
+          </a:bodyPr>
+          <a:lstStyle/>
+          <a:p>
+            <a:r>
+              <a:rPr lang="zh-CN" altLang="en-US" sz="3200" dirty="0">
+                <a:latin typeface="+mn-ea"/>
+              </a:rPr>
+              <a:t>致谢</a:t>
+            </a:r>
+          </a:p>
+        </p:txBody>
+      </p:sp>
+      <p:sp>
+        <p:nvSpPr>
+          <p:cNvPr id="11" name="文本框 10">
+            <a:extLst>
+              <a:ext uri="{FF2B5EF4-FFF2-40B4-BE49-F238E27FC236}">
+                <a16:creationId xmlns:a16="http://schemas.microsoft.com/office/drawing/2014/main" id="{5E42145F-B4D5-0488-F92D-DD8B3BC47448}"/>
+              </a:ext>
+            </a:extLst>
+          </p:cNvPr>
+          <p:cNvSpPr txBox="1"/>
+          <p:nvPr/>
+        </p:nvSpPr>
+        <p:spPr>
+          <a:xfrm>
+            <a:off x="3896574" y="2346120"/>
+            <a:ext cx="481673" cy="307777"/>
+          </a:xfrm>
+          <a:prstGeom prst="rect">
+            <a:avLst/>
+          </a:prstGeom>
+          <a:noFill/>
+        </p:spPr>
+        <p:txBody>
+          <a:bodyPr wrap="square" rtlCol="0">
+            <a:spAutoFit/>
+          </a:bodyPr>
+          <a:lstStyle/>
+          <a:p>
+            <a:r>
+              <a:rPr lang="zh-CN" altLang="en-US" sz="1400" dirty="0"/>
+              <a:t>●</a:t>
+            </a:r>
+            <a:endParaRPr lang="zh-CN" altLang="en-US" sz="1600" dirty="0"/>
+          </a:p>
+        </p:txBody>
+      </p:sp>
+      <p:sp>
+        <p:nvSpPr>
+          <p:cNvPr id="13" name="文本框 12">
+            <a:extLst>
+              <a:ext uri="{FF2B5EF4-FFF2-40B4-BE49-F238E27FC236}">
+                <a16:creationId xmlns:a16="http://schemas.microsoft.com/office/drawing/2014/main" id="{FF3F10E6-A221-178B-C795-82525382045F}"/>
+              </a:ext>
+            </a:extLst>
+          </p:cNvPr>
+          <p:cNvSpPr txBox="1"/>
+          <p:nvPr/>
+        </p:nvSpPr>
+        <p:spPr>
+          <a:xfrm>
+            <a:off x="3896574" y="2916943"/>
+            <a:ext cx="481673" cy="307777"/>
+          </a:xfrm>
+          <a:prstGeom prst="rect">
+            <a:avLst/>
+          </a:prstGeom>
+          <a:noFill/>
+        </p:spPr>
+        <p:txBody>
+          <a:bodyPr wrap="square" rtlCol="0">
+            <a:spAutoFit/>
+          </a:bodyPr>
+          <a:lstStyle/>
+          <a:p>
+            <a:r>
+              <a:rPr lang="zh-CN" altLang="en-US" sz="1400" dirty="0"/>
+              <a:t>●</a:t>
+            </a:r>
+            <a:endParaRPr lang="zh-CN" altLang="en-US" sz="1600" dirty="0"/>
+          </a:p>
+        </p:txBody>
+      </p:sp>
+      <p:sp>
+        <p:nvSpPr>
+          <p:cNvPr id="14" name="文本框 13">
+            <a:extLst>
+              <a:ext uri="{FF2B5EF4-FFF2-40B4-BE49-F238E27FC236}">
+                <a16:creationId xmlns:a16="http://schemas.microsoft.com/office/drawing/2014/main" id="{B5FE152F-16D8-E15F-90D3-872136FF3BD5}"/>
+              </a:ext>
+            </a:extLst>
+          </p:cNvPr>
+          <p:cNvSpPr txBox="1"/>
+          <p:nvPr/>
+        </p:nvSpPr>
+        <p:spPr>
+          <a:xfrm>
+            <a:off x="3896574" y="3488607"/>
+            <a:ext cx="481673" cy="307777"/>
+          </a:xfrm>
+          <a:prstGeom prst="rect">
+            <a:avLst/>
+          </a:prstGeom>
+          <a:noFill/>
+        </p:spPr>
+        <p:txBody>
+          <a:bodyPr wrap="square" rtlCol="0">
+            <a:spAutoFit/>
+          </a:bodyPr>
+          <a:lstStyle/>
+          <a:p>
+            <a:r>
+              <a:rPr lang="zh-CN" altLang="en-US" sz="1400" dirty="0"/>
+              <a:t>●</a:t>
+            </a:r>
+            <a:endParaRPr lang="zh-CN" altLang="en-US" sz="1600" dirty="0"/>
+          </a:p>
+        </p:txBody>
+      </p:sp>
+      <p:sp>
+        <p:nvSpPr>
+          <p:cNvPr id="15" name="文本框 14">
+            <a:extLst>
+              <a:ext uri="{FF2B5EF4-FFF2-40B4-BE49-F238E27FC236}">
+                <a16:creationId xmlns:a16="http://schemas.microsoft.com/office/drawing/2014/main" id="{57F0C635-8420-817A-3708-013226A34CC4}"/>
+              </a:ext>
+            </a:extLst>
+          </p:cNvPr>
+          <p:cNvSpPr txBox="1"/>
+          <p:nvPr/>
+        </p:nvSpPr>
+        <p:spPr>
+          <a:xfrm>
+            <a:off x="3896574" y="4059851"/>
+            <a:ext cx="481673" cy="307777"/>
+          </a:xfrm>
+          <a:prstGeom prst="rect">
+            <a:avLst/>
+          </a:prstGeom>
+          <a:noFill/>
+        </p:spPr>
+        <p:txBody>
+          <a:bodyPr wrap="square" rtlCol="0">
+            <a:spAutoFit/>
+          </a:bodyPr>
+          <a:lstStyle/>
+          <a:p>
+            <a:r>
+              <a:rPr lang="zh-CN" altLang="en-US" sz="1400" dirty="0"/>
+              <a:t>●</a:t>
+            </a:r>
+            <a:endParaRPr lang="zh-CN" altLang="en-US" sz="1600" dirty="0"/>
+          </a:p>
+        </p:txBody>
+      </p:sp>
+      <p:sp>
+        <p:nvSpPr>
+          <p:cNvPr id="16" name="文本框 15">
+            <a:extLst>
+              <a:ext uri="{FF2B5EF4-FFF2-40B4-BE49-F238E27FC236}">
+                <a16:creationId xmlns:a16="http://schemas.microsoft.com/office/drawing/2014/main" id="{9623BFE3-3EBA-1E70-3B42-0604226ED54A}"/>
+              </a:ext>
+            </a:extLst>
+          </p:cNvPr>
+          <p:cNvSpPr txBox="1"/>
+          <p:nvPr/>
+        </p:nvSpPr>
+        <p:spPr>
+          <a:xfrm>
+            <a:off x="3896574" y="4631095"/>
+            <a:ext cx="481673" cy="307777"/>
+          </a:xfrm>
+          <a:prstGeom prst="rect">
+            <a:avLst/>
+          </a:prstGeom>
+          <a:noFill/>
+        </p:spPr>
+        <p:txBody>
+          <a:bodyPr wrap="square" rtlCol="0">
+            <a:spAutoFit/>
+          </a:bodyPr>
+          <a:lstStyle/>
+          <a:p>
+            <a:r>
+              <a:rPr lang="zh-CN" altLang="en-US" sz="1400" dirty="0"/>
+              <a:t>●</a:t>
+            </a:r>
+            <a:endParaRPr lang="zh-CN" altLang="en-US" sz="1600" dirty="0"/>
+          </a:p>
+        </p:txBody>
+      </p:sp>
+      <p:sp>
+        <p:nvSpPr>
+          <p:cNvPr id="17" name="文本框 16">
+            <a:extLst>
+              <a:ext uri="{FF2B5EF4-FFF2-40B4-BE49-F238E27FC236}">
+                <a16:creationId xmlns:a16="http://schemas.microsoft.com/office/drawing/2014/main" id="{6B610205-07C8-C4B4-E4ED-057E860500BD}"/>
+              </a:ext>
+            </a:extLst>
+          </p:cNvPr>
+          <p:cNvSpPr txBox="1"/>
+          <p:nvPr/>
+        </p:nvSpPr>
+        <p:spPr>
+          <a:xfrm>
+            <a:off x="3896574" y="5202338"/>
+            <a:ext cx="481673" cy="307777"/>
+          </a:xfrm>
+          <a:prstGeom prst="rect">
+            <a:avLst/>
+          </a:prstGeom>
+          <a:noFill/>
+        </p:spPr>
+        <p:txBody>
+          <a:bodyPr wrap="square" rtlCol="0">
+            <a:spAutoFit/>
+          </a:bodyPr>
+          <a:lstStyle/>
+          <a:p>
+            <a:r>
+              <a:rPr lang="zh-CN" altLang="en-US" sz="1400" dirty="0"/>
+              <a:t>●</a:t>
+            </a:r>
+            <a:endParaRPr lang="zh-CN" altLang="en-US" sz="1600" dirty="0"/>
+          </a:p>
+        </p:txBody>
+      </p:sp>
+    </p:spTree>
+    <p:extLst>
+      <p:ext uri="{BB962C8B-B14F-4D97-AF65-F5344CB8AC3E}">
+        <p14:creationId xmlns:p14="http://schemas.microsoft.com/office/powerpoint/2010/main" val="3296084347"/>
+      </p:ext>
+    </p:extLst>
+  </p:cSld>
+  <p:clrMapOvr>
+    <a:masterClrMapping/>
+  </p:clrMapOvr>
+  <mc:AlternateContent xmlns:mc="http://schemas.openxmlformats.org/markup-compatibility/2006">
+    <mc:Choice xmlns:p159="http://schemas.microsoft.com/office/powerpoint/2015/09/main" Requires="p159">
+      <p:transition xmlns:p14="http://schemas.microsoft.com/office/powerpoint/2010/main" spd="slow" p14:dur="2000">
+        <p159:morph option="byObject"/>
+      </p:transition>
+    </mc:Choice>
+    <mc:Fallback>
+      <p:transition spd="slow">
+        <p:fade/>
+      </p:transition>
+    </mc:Fallback>
+  </mc:AlternateContent>
+</p:sld>
+</file>
+
+<file path=ppt/slides/slide7.xml><?xml version="1.0" encoding="utf-8"?>
+<p:sld xmlns:a="http://schemas.openxmlformats.org/drawingml/2006/main" xmlns:r="http://schemas.openxmlformats.org/officeDocument/2006/relationships" xmlns:p="http://schemas.openxmlformats.org/presentationml/2006/main">
+  <p:cSld>
+    <p:spTree>
+      <p:nvGrpSpPr>
+        <p:cNvPr id="1" name="">
+          <a:extLst>
+            <a:ext uri="{FF2B5EF4-FFF2-40B4-BE49-F238E27FC236}">
+              <a16:creationId xmlns:a16="http://schemas.microsoft.com/office/drawing/2014/main" id="{79044FD5-1ECE-65CD-DBFA-5972816C0082}"/>
+            </a:ext>
+          </a:extLst>
+        </p:cNvPr>
+        <p:cNvGrpSpPr/>
+        <p:nvPr/>
+      </p:nvGrpSpPr>
+      <p:grpSpPr>
+        <a:xfrm>
+          <a:off x="0" y="0"/>
+          <a:ext cx="0" cy="0"/>
+          <a:chOff x="0" y="0"/>
+          <a:chExt cx="0" cy="0"/>
+        </a:xfrm>
+      </p:grpSpPr>
+      <p:pic>
+        <p:nvPicPr>
+          <p:cNvPr id="6" name="图片 5">
+            <a:extLst>
+              <a:ext uri="{FF2B5EF4-FFF2-40B4-BE49-F238E27FC236}">
+                <a16:creationId xmlns:a16="http://schemas.microsoft.com/office/drawing/2014/main" id="{469A4789-A5CB-6639-F4B0-27DFCE8D4956}"/>
+              </a:ext>
+            </a:extLst>
+          </p:cNvPr>
+          <p:cNvPicPr>
+            <a:picLocks noChangeAspect="1"/>
+          </p:cNvPicPr>
+          <p:nvPr/>
+        </p:nvPicPr>
+        <p:blipFill>
+          <a:blip r:embed="rId2">
+            <a:alphaModFix amt="85000"/>
+            <a:extLst>
+              <a:ext uri="{28A0092B-C50C-407E-A947-70E740481C1C}">
+                <a14:useLocalDpi xmlns:a14="http://schemas.microsoft.com/office/drawing/2010/main" val="0"/>
+              </a:ext>
+            </a:extLst>
+          </a:blip>
+          <a:srcRect l="4134" t="4134" r="4548" b="4548"/>
+          <a:stretch/>
+        </p:blipFill>
+        <p:spPr>
+          <a:xfrm>
+            <a:off x="63500" y="63500"/>
+            <a:ext cx="900000" cy="900000"/>
+          </a:xfrm>
+          <a:prstGeom prst="ellipse">
+            <a:avLst/>
+          </a:prstGeom>
+        </p:spPr>
+      </p:pic>
+      <p:sp>
+        <p:nvSpPr>
+          <p:cNvPr id="3" name="文本框 2">
+            <a:extLst>
+              <a:ext uri="{FF2B5EF4-FFF2-40B4-BE49-F238E27FC236}">
+                <a16:creationId xmlns:a16="http://schemas.microsoft.com/office/drawing/2014/main" id="{1ADD2693-7008-E250-8C47-135EE0C8A628}"/>
+              </a:ext>
+            </a:extLst>
+          </p:cNvPr>
+          <p:cNvSpPr txBox="1"/>
+          <p:nvPr/>
+        </p:nvSpPr>
+        <p:spPr>
+          <a:xfrm>
+            <a:off x="963500" y="221112"/>
+            <a:ext cx="2888984" cy="584775"/>
+          </a:xfrm>
+          <a:prstGeom prst="rect">
+            <a:avLst/>
+          </a:prstGeom>
+          <a:noFill/>
+        </p:spPr>
+        <p:txBody>
+          <a:bodyPr wrap="square" rtlCol="0">
+            <a:spAutoFit/>
+          </a:bodyPr>
+          <a:lstStyle/>
+          <a:p>
+            <a:r>
+              <a:rPr lang="zh-CN" altLang="en-US" sz="3200" b="1" dirty="0">
+                <a:latin typeface="+mn-ea"/>
+              </a:rPr>
+              <a:t>项目分工</a:t>
+            </a:r>
+          </a:p>
+        </p:txBody>
+      </p:sp>
+      <p:pic>
+        <p:nvPicPr>
+          <p:cNvPr id="5" name="图片 4">
+            <a:extLst>
+              <a:ext uri="{FF2B5EF4-FFF2-40B4-BE49-F238E27FC236}">
+                <a16:creationId xmlns:a16="http://schemas.microsoft.com/office/drawing/2014/main" id="{1560E41B-14D8-8521-646D-4EAB487F3A9F}"/>
+              </a:ext>
+            </a:extLst>
+          </p:cNvPr>
+          <p:cNvPicPr>
+            <a:picLocks noChangeAspect="1"/>
+          </p:cNvPicPr>
+          <p:nvPr/>
+        </p:nvPicPr>
+        <p:blipFill>
+          <a:blip r:embed="rId3">
+            <a:extLst>
+              <a:ext uri="{28A0092B-C50C-407E-A947-70E740481C1C}">
+                <a14:useLocalDpi xmlns:a14="http://schemas.microsoft.com/office/drawing/2010/main" val="0"/>
+              </a:ext>
+            </a:extLst>
+          </a:blip>
+          <a:stretch>
+            <a:fillRect/>
+          </a:stretch>
+        </p:blipFill>
+        <p:spPr>
+          <a:xfrm>
+            <a:off x="298449" y="1766489"/>
+            <a:ext cx="4846750" cy="3461964"/>
+          </a:xfrm>
+          <a:prstGeom prst="rect">
+            <a:avLst/>
+          </a:prstGeom>
+        </p:spPr>
+      </p:pic>
+      <p:pic>
+        <p:nvPicPr>
+          <p:cNvPr id="8" name="图片 7">
+            <a:extLst>
+              <a:ext uri="{FF2B5EF4-FFF2-40B4-BE49-F238E27FC236}">
+                <a16:creationId xmlns:a16="http://schemas.microsoft.com/office/drawing/2014/main" id="{4B26D946-1A13-6781-AF3E-34741BEC1B9D}"/>
+              </a:ext>
+            </a:extLst>
+          </p:cNvPr>
+          <p:cNvPicPr>
+            <a:picLocks noChangeAspect="1"/>
+          </p:cNvPicPr>
+          <p:nvPr/>
+        </p:nvPicPr>
+        <p:blipFill>
+          <a:blip r:embed="rId4">
+            <a:extLst>
+              <a:ext uri="{28A0092B-C50C-407E-A947-70E740481C1C}">
+                <a14:useLocalDpi xmlns:a14="http://schemas.microsoft.com/office/drawing/2010/main" val="0"/>
+              </a:ext>
+            </a:extLst>
+          </a:blip>
+          <a:srcRect l="13518" t="8884" r="13849" b="5320"/>
+          <a:stretch/>
+        </p:blipFill>
+        <p:spPr>
+          <a:xfrm>
+            <a:off x="6483349" y="1766489"/>
+            <a:ext cx="4629151" cy="3461964"/>
+          </a:xfrm>
+          <a:prstGeom prst="rect">
+            <a:avLst/>
+          </a:prstGeom>
+        </p:spPr>
+      </p:pic>
+    </p:spTree>
+    <p:extLst>
+      <p:ext uri="{BB962C8B-B14F-4D97-AF65-F5344CB8AC3E}">
+        <p14:creationId xmlns:p14="http://schemas.microsoft.com/office/powerpoint/2010/main" val="1768871947"/>
       </p:ext>
     </p:extLst>
   </p:cSld>
@@ -3830,4 +7599,299 @@
     </a:ext>
   </a:extLst>
 </a:theme>
+</file>
+
+<file path=ppt/theme/theme2.xml><?xml version="1.0" encoding="utf-8"?>
+<a:theme xmlns:a="http://schemas.openxmlformats.org/drawingml/2006/main" name="Office 主题​​">
+  <a:themeElements>
+    <a:clrScheme name="Office">
+      <a:dk1>
+        <a:sysClr val="windowText" lastClr="000000"/>
+      </a:dk1>
+      <a:lt1>
+        <a:sysClr val="window" lastClr="FFFFFF"/>
+      </a:lt1>
+      <a:dk2>
+        <a:srgbClr val="44546A"/>
+      </a:dk2>
+      <a:lt2>
+        <a:srgbClr val="E7E6E6"/>
+      </a:lt2>
+      <a:accent1>
+        <a:srgbClr val="4472C4"/>
+      </a:accent1>
+      <a:accent2>
+        <a:srgbClr val="ED7D31"/>
+      </a:accent2>
+      <a:accent3>
+        <a:srgbClr val="A5A5A5"/>
+      </a:accent3>
+      <a:accent4>
+        <a:srgbClr val="FFC000"/>
+      </a:accent4>
+      <a:accent5>
+        <a:srgbClr val="5B9BD5"/>
+      </a:accent5>
+      <a:accent6>
+        <a:srgbClr val="70AD47"/>
+      </a:accent6>
+      <a:hlink>
+        <a:srgbClr val="0563C1"/>
+      </a:hlink>
+      <a:folHlink>
+        <a:srgbClr val="954F72"/>
+      </a:folHlink>
+    </a:clrScheme>
+    <a:fontScheme name="Office">
+      <a:majorFont>
+        <a:latin typeface="等线 Light" panose="020F0302020204030204"/>
+        <a:ea typeface=""/>
+        <a:cs typeface=""/>
+        <a:font script="Jpan" typeface="游ゴシック Light"/>
+        <a:font script="Hang" typeface="맑은 고딕"/>
+        <a:font script="Hans" typeface="等线 Light"/>
+        <a:font script="Hant" typeface="新細明體"/>
+        <a:font script="Arab" typeface="Times New Roman"/>
+        <a:font script="Hebr" typeface="Times New Roman"/>
+        <a:font script="Thai" typeface="Angsana New"/>
+        <a:font script="Ethi" typeface="Nyala"/>
+        <a:font script="Beng" typeface="Vrinda"/>
+        <a:font script="Gujr" typeface="Shruti"/>
+        <a:font script="Khmr" typeface="MoolBoran"/>
+        <a:font script="Knda" typeface="Tunga"/>
+        <a:font script="Guru" typeface="Raavi"/>
+        <a:font script="Cans" typeface="Euphemia"/>
+        <a:font script="Cher" typeface="Plantagenet Cherokee"/>
+        <a:font script="Yiii" typeface="Microsoft Yi Baiti"/>
+        <a:font script="Tibt" typeface="Microsoft Himalaya"/>
+        <a:font script="Thaa" typeface="MV Boli"/>
+        <a:font script="Deva" typeface="Mangal"/>
+        <a:font script="Telu" typeface="Gautami"/>
+        <a:font script="Taml" typeface="Latha"/>
+        <a:font script="Syrc" typeface="Estrangelo Edessa"/>
+        <a:font script="Orya" typeface="Kalinga"/>
+        <a:font script="Mlym" typeface="Kartika"/>
+        <a:font script="Laoo" typeface="DokChampa"/>
+        <a:font script="Sinh" typeface="Iskoola Pota"/>
+        <a:font script="Mong" typeface="Mongolian Baiti"/>
+        <a:font script="Viet" typeface="Times New Roman"/>
+        <a:font script="Uigh" typeface="Microsoft Uighur"/>
+        <a:font script="Geor" typeface="Sylfaen"/>
+        <a:font script="Armn" typeface="Arial"/>
+        <a:font script="Bugi" typeface="Leelawadee UI"/>
+        <a:font script="Bopo" typeface="Microsoft JhengHei"/>
+        <a:font script="Java" typeface="Javanese Text"/>
+        <a:font script="Lisu" typeface="Segoe UI"/>
+        <a:font script="Mymr" typeface="Myanmar Text"/>
+        <a:font script="Nkoo" typeface="Ebrima"/>
+        <a:font script="Olck" typeface="Nirmala UI"/>
+        <a:font script="Osma" typeface="Ebrima"/>
+        <a:font script="Phag" typeface="Phagspa"/>
+        <a:font script="Syrn" typeface="Estrangelo Edessa"/>
+        <a:font script="Syrj" typeface="Estrangelo Edessa"/>
+        <a:font script="Syre" typeface="Estrangelo Edessa"/>
+        <a:font script="Sora" typeface="Nirmala UI"/>
+        <a:font script="Tale" typeface="Microsoft Tai Le"/>
+        <a:font script="Talu" typeface="Microsoft New Tai Lue"/>
+        <a:font script="Tfng" typeface="Ebrima"/>
+      </a:majorFont>
+      <a:minorFont>
+        <a:latin typeface="等线" panose="020F0502020204030204"/>
+        <a:ea typeface=""/>
+        <a:cs typeface=""/>
+        <a:font script="Jpan" typeface="游ゴシック"/>
+        <a:font script="Hang" typeface="맑은 고딕"/>
+        <a:font script="Hans" typeface="等线"/>
+        <a:font script="Hant" typeface="新細明體"/>
+        <a:font script="Arab" typeface="Arial"/>
+        <a:font script="Hebr" typeface="Arial"/>
+        <a:font script="Thai" typeface="Cordia New"/>
+        <a:font script="Ethi" typeface="Nyala"/>
+        <a:font script="Beng" typeface="Vrinda"/>
+        <a:font script="Gujr" typeface="Shruti"/>
+        <a:font script="Khmr" typeface="DaunPenh"/>
+        <a:font script="Knda" typeface="Tunga"/>
+        <a:font script="Guru" typeface="Raavi"/>
+        <a:font script="Cans" typeface="Euphemia"/>
+        <a:font script="Cher" typeface="Plantagenet Cherokee"/>
+        <a:font script="Yiii" typeface="Microsoft Yi Baiti"/>
+        <a:font script="Tibt" typeface="Microsoft Himalaya"/>
+        <a:font script="Thaa" typeface="MV Boli"/>
+        <a:font script="Deva" typeface="Mangal"/>
+        <a:font script="Telu" typeface="Gautami"/>
+        <a:font script="Taml" typeface="Latha"/>
+        <a:font script="Syrc" typeface="Estrangelo Edessa"/>
+        <a:font script="Orya" typeface="Kalinga"/>
+        <a:font script="Mlym" typeface="Kartika"/>
+        <a:font script="Laoo" typeface="DokChampa"/>
+        <a:font script="Sinh" typeface="Iskoola Pota"/>
+        <a:font script="Mong" typeface="Mongolian Baiti"/>
+        <a:font script="Viet" typeface="Arial"/>
+        <a:font script="Uigh" typeface="Microsoft Uighur"/>
+        <a:font script="Geor" typeface="Sylfaen"/>
+        <a:font script="Armn" typeface="Arial"/>
+        <a:font script="Bugi" typeface="Leelawadee UI"/>
+        <a:font script="Bopo" typeface="Microsoft JhengHei"/>
+        <a:font script="Java" typeface="Javanese Text"/>
+        <a:font script="Lisu" typeface="Segoe UI"/>
+        <a:font script="Mymr" typeface="Myanmar Text"/>
+        <a:font script="Nkoo" typeface="Ebrima"/>
+        <a:font script="Olck" typeface="Nirmala UI"/>
+        <a:font script="Osma" typeface="Ebrima"/>
+        <a:font script="Phag" typeface="Phagspa"/>
+        <a:font script="Syrn" typeface="Estrangelo Edessa"/>
+        <a:font script="Syrj" typeface="Estrangelo Edessa"/>
+        <a:font script="Syre" typeface="Estrangelo Edessa"/>
+        <a:font script="Sora" typeface="Nirmala UI"/>
+        <a:font script="Tale" typeface="Microsoft Tai Le"/>
+        <a:font script="Talu" typeface="Microsoft New Tai Lue"/>
+        <a:font script="Tfng" typeface="Ebrima"/>
+      </a:minorFont>
+    </a:fontScheme>
+    <a:fmtScheme name="Office">
+      <a:fillStyleLst>
+        <a:solidFill>
+          <a:schemeClr val="phClr"/>
+        </a:solidFill>
+        <a:gradFill rotWithShape="1">
+          <a:gsLst>
+            <a:gs pos="0">
+              <a:schemeClr val="phClr">
+                <a:lumMod val="110000"/>
+                <a:satMod val="105000"/>
+                <a:tint val="67000"/>
+              </a:schemeClr>
+            </a:gs>
+            <a:gs pos="50000">
+              <a:schemeClr val="phClr">
+                <a:lumMod val="105000"/>
+                <a:satMod val="103000"/>
+                <a:tint val="73000"/>
+              </a:schemeClr>
+            </a:gs>
+            <a:gs pos="100000">
+              <a:schemeClr val="phClr">
+                <a:lumMod val="105000"/>
+                <a:satMod val="109000"/>
+                <a:tint val="81000"/>
+              </a:schemeClr>
+            </a:gs>
+          </a:gsLst>
+          <a:lin ang="5400000" scaled="0"/>
+        </a:gradFill>
+        <a:gradFill rotWithShape="1">
+          <a:gsLst>
+            <a:gs pos="0">
+              <a:schemeClr val="phClr">
+                <a:satMod val="103000"/>
+                <a:lumMod val="102000"/>
+                <a:tint val="94000"/>
+              </a:schemeClr>
+            </a:gs>
+            <a:gs pos="50000">
+              <a:schemeClr val="phClr">
+                <a:satMod val="110000"/>
+                <a:lumMod val="100000"/>
+                <a:shade val="100000"/>
+              </a:schemeClr>
+            </a:gs>
+            <a:gs pos="100000">
+              <a:schemeClr val="phClr">
+                <a:lumMod val="99000"/>
+                <a:satMod val="120000"/>
+                <a:shade val="78000"/>
+              </a:schemeClr>
+            </a:gs>
+          </a:gsLst>
+          <a:lin ang="5400000" scaled="0"/>
+        </a:gradFill>
+      </a:fillStyleLst>
+      <a:lnStyleLst>
+        <a:ln w="6350" cap="flat" cmpd="sng" algn="ctr">
+          <a:solidFill>
+            <a:schemeClr val="phClr"/>
+          </a:solidFill>
+          <a:prstDash val="solid"/>
+          <a:miter lim="800000"/>
+        </a:ln>
+        <a:ln w="12700" cap="flat" cmpd="sng" algn="ctr">
+          <a:solidFill>
+            <a:schemeClr val="phClr"/>
+          </a:solidFill>
+          <a:prstDash val="solid"/>
+          <a:miter lim="800000"/>
+        </a:ln>
+        <a:ln w="19050" cap="flat" cmpd="sng" algn="ctr">
+          <a:solidFill>
+            <a:schemeClr val="phClr"/>
+          </a:solidFill>
+          <a:prstDash val="solid"/>
+          <a:miter lim="800000"/>
+        </a:ln>
+      </a:lnStyleLst>
+      <a:effectStyleLst>
+        <a:effectStyle>
+          <a:effectLst/>
+        </a:effectStyle>
+        <a:effectStyle>
+          <a:effectLst/>
+        </a:effectStyle>
+        <a:effectStyle>
+          <a:effectLst>
+            <a:outerShdw blurRad="57150" dist="19050" dir="5400000" algn="ctr" rotWithShape="0">
+              <a:srgbClr val="000000">
+                <a:alpha val="63000"/>
+              </a:srgbClr>
+            </a:outerShdw>
+          </a:effectLst>
+        </a:effectStyle>
+      </a:effectStyleLst>
+      <a:bgFillStyleLst>
+        <a:solidFill>
+          <a:schemeClr val="phClr"/>
+        </a:solidFill>
+        <a:solidFill>
+          <a:schemeClr val="phClr">
+            <a:tint val="95000"/>
+            <a:satMod val="170000"/>
+          </a:schemeClr>
+        </a:solidFill>
+        <a:gradFill rotWithShape="1">
+          <a:gsLst>
+            <a:gs pos="0">
+              <a:schemeClr val="phClr">
+                <a:tint val="93000"/>
+                <a:satMod val="150000"/>
+                <a:shade val="98000"/>
+                <a:lumMod val="102000"/>
+              </a:schemeClr>
+            </a:gs>
+            <a:gs pos="50000">
+              <a:schemeClr val="phClr">
+                <a:tint val="98000"/>
+                <a:satMod val="130000"/>
+                <a:shade val="90000"/>
+                <a:lumMod val="103000"/>
+              </a:schemeClr>
+            </a:gs>
+            <a:gs pos="100000">
+              <a:schemeClr val="phClr">
+                <a:shade val="63000"/>
+                <a:satMod val="120000"/>
+              </a:schemeClr>
+            </a:gs>
+          </a:gsLst>
+          <a:lin ang="5400000" scaled="0"/>
+        </a:gradFill>
+      </a:bgFillStyleLst>
+    </a:fmtScheme>
+  </a:themeElements>
+  <a:objectDefaults/>
+  <a:extraClrSchemeLst/>
+  <a:extLst>
+    <a:ext uri="{05A4C25C-085E-4340-85A3-A5531E510DB2}">
+      <thm15:themeFamily xmlns:thm15="http://schemas.microsoft.com/office/thememl/2012/main" name="Office Theme" id="{62F939B6-93AF-4DB8-9C6B-D6C7DFDC589F}" vid="{4A3C46E8-61CC-4603-A589-7422A47A8E4A}"/>
+    </a:ext>
+  </a:extLst>
+</a:theme>
 </file>
</xml_diff>